<commit_message>
Updated Presentation, finalised code for 20.11.2025 presentation
</commit_message>
<xml_diff>
--- a/Presentation/Strategy_Pitch (2).pptx
+++ b/Presentation/Strategy_Pitch (2).pptx
@@ -5,10 +5,10 @@
     <p:sldMasterId id="2147483744" r:id="rId1"/>
   </p:sldMasterIdLst>
   <p:notesMasterIdLst>
-    <p:notesMasterId r:id="rId14"/>
+    <p:notesMasterId r:id="rId19"/>
   </p:notesMasterIdLst>
   <p:handoutMasterIdLst>
-    <p:handoutMasterId r:id="rId15"/>
+    <p:handoutMasterId r:id="rId20"/>
   </p:handoutMasterIdLst>
   <p:sldIdLst>
     <p:sldId id="256" r:id="rId2"/>
@@ -17,12 +17,17 @@
     <p:sldId id="276" r:id="rId5"/>
     <p:sldId id="291" r:id="rId6"/>
     <p:sldId id="292" r:id="rId7"/>
-    <p:sldId id="293" r:id="rId8"/>
-    <p:sldId id="294" r:id="rId9"/>
-    <p:sldId id="298" r:id="rId10"/>
+    <p:sldId id="298" r:id="rId8"/>
+    <p:sldId id="293" r:id="rId9"/>
+    <p:sldId id="294" r:id="rId10"/>
     <p:sldId id="295" r:id="rId11"/>
-    <p:sldId id="296" r:id="rId12"/>
-    <p:sldId id="297" r:id="rId13"/>
+    <p:sldId id="300" r:id="rId12"/>
+    <p:sldId id="301" r:id="rId13"/>
+    <p:sldId id="296" r:id="rId14"/>
+    <p:sldId id="297" r:id="rId15"/>
+    <p:sldId id="299" r:id="rId16"/>
+    <p:sldId id="302" r:id="rId17"/>
+    <p:sldId id="303" r:id="rId18"/>
   </p:sldIdLst>
   <p:sldSz cx="12192000" cy="6858000"/>
   <p:notesSz cx="6858000" cy="9144000"/>
@@ -7534,6 +7539,363 @@
           <a:chExt cx="0" cy="0"/>
         </a:xfrm>
       </p:grpSpPr>
+      <p:sp>
+        <p:nvSpPr>
+          <p:cNvPr id="2" name="TextBox 1">
+            <a:extLst>
+              <a:ext uri="{FF2B5EF4-FFF2-40B4-BE49-F238E27FC236}">
+                <a16:creationId xmlns:a16="http://schemas.microsoft.com/office/drawing/2014/main" id="{BB307793-7712-5E09-AF30-DE11FC656F79}"/>
+              </a:ext>
+            </a:extLst>
+          </p:cNvPr>
+          <p:cNvSpPr txBox="1"/>
+          <p:nvPr/>
+        </p:nvSpPr>
+        <p:spPr>
+          <a:xfrm>
+            <a:off x="616226" y="2274838"/>
+            <a:ext cx="9746974" cy="2308324"/>
+          </a:xfrm>
+          <a:prstGeom prst="rect">
+            <a:avLst/>
+          </a:prstGeom>
+          <a:noFill/>
+        </p:spPr>
+        <p:txBody>
+          <a:bodyPr wrap="square" rtlCol="0">
+            <a:spAutoFit/>
+          </a:bodyPr>
+          <a:lstStyle/>
+          <a:p>
+            <a:r>
+              <a:rPr lang="en-US" sz="2400" dirty="0">
+                <a:latin typeface="Aptos" panose="020B0004020202020204" pitchFamily="34" charset="0"/>
+              </a:rPr>
+              <a:t>Annual Return:   </a:t>
+            </a:r>
+            <a:r>
+              <a:rPr lang="en-US" sz="2400" b="1" dirty="0">
+                <a:latin typeface="Aptos" panose="020B0004020202020204" pitchFamily="34" charset="0"/>
+              </a:rPr>
+              <a:t>12.67%</a:t>
+            </a:r>
+            <a:r>
+              <a:rPr lang="en-US" sz="2400" dirty="0">
+                <a:latin typeface="Aptos" panose="020B0004020202020204" pitchFamily="34" charset="0"/>
+              </a:rPr>
+              <a:t> | Benchmark: </a:t>
+            </a:r>
+            <a:r>
+              <a:rPr lang="en-US" sz="2400" b="1" dirty="0">
+                <a:latin typeface="Aptos" panose="020B0004020202020204" pitchFamily="34" charset="0"/>
+              </a:rPr>
+              <a:t>8.10%</a:t>
+            </a:r>
+          </a:p>
+          <a:p>
+            <a:r>
+              <a:rPr lang="en-US" sz="2400" dirty="0">
+                <a:latin typeface="Aptos" panose="020B0004020202020204" pitchFamily="34" charset="0"/>
+              </a:rPr>
+              <a:t>Annual Vol:      </a:t>
+            </a:r>
+            <a:r>
+              <a:rPr lang="en-US" sz="2400" b="1" dirty="0">
+                <a:latin typeface="Aptos" panose="020B0004020202020204" pitchFamily="34" charset="0"/>
+              </a:rPr>
+              <a:t>18.96%</a:t>
+            </a:r>
+            <a:r>
+              <a:rPr lang="en-US" sz="2400" dirty="0">
+                <a:latin typeface="Aptos" panose="020B0004020202020204" pitchFamily="34" charset="0"/>
+              </a:rPr>
+              <a:t> | Benchmark: </a:t>
+            </a:r>
+            <a:r>
+              <a:rPr lang="en-US" sz="2400" b="1" dirty="0">
+                <a:latin typeface="Aptos" panose="020B0004020202020204" pitchFamily="34" charset="0"/>
+              </a:rPr>
+              <a:t>19.20%</a:t>
+            </a:r>
+          </a:p>
+          <a:p>
+            <a:r>
+              <a:rPr lang="en-US" sz="2400" dirty="0">
+                <a:latin typeface="Aptos" panose="020B0004020202020204" pitchFamily="34" charset="0"/>
+              </a:rPr>
+              <a:t>Sharpe Ratio:    </a:t>
+            </a:r>
+            <a:r>
+              <a:rPr lang="en-US" sz="2400" b="1" dirty="0">
+                <a:latin typeface="Aptos" panose="020B0004020202020204" pitchFamily="34" charset="0"/>
+              </a:rPr>
+              <a:t>0.67</a:t>
+            </a:r>
+            <a:r>
+              <a:rPr lang="en-US" sz="2400" dirty="0">
+                <a:latin typeface="Aptos" panose="020B0004020202020204" pitchFamily="34" charset="0"/>
+              </a:rPr>
+              <a:t> | Benchmark: </a:t>
+            </a:r>
+            <a:r>
+              <a:rPr lang="en-US" sz="2400" b="1" dirty="0">
+                <a:latin typeface="Aptos" panose="020B0004020202020204" pitchFamily="34" charset="0"/>
+              </a:rPr>
+              <a:t>0.42</a:t>
+            </a:r>
+          </a:p>
+          <a:p>
+            <a:r>
+              <a:rPr lang="en-US" sz="2400" dirty="0">
+                <a:latin typeface="Aptos" panose="020B0004020202020204" pitchFamily="34" charset="0"/>
+              </a:rPr>
+              <a:t>Max Drawdown: </a:t>
+            </a:r>
+            <a:r>
+              <a:rPr lang="en-US" sz="2400" b="1" dirty="0">
+                <a:latin typeface="Aptos" panose="020B0004020202020204" pitchFamily="34" charset="0"/>
+              </a:rPr>
+              <a:t>-41.67% </a:t>
+            </a:r>
+            <a:r>
+              <a:rPr lang="en-US" sz="2400" dirty="0">
+                <a:latin typeface="Aptos" panose="020B0004020202020204" pitchFamily="34" charset="0"/>
+              </a:rPr>
+              <a:t>| Benchmark: </a:t>
+            </a:r>
+            <a:r>
+              <a:rPr lang="en-US" sz="2400" b="1" dirty="0">
+                <a:latin typeface="Aptos" panose="020B0004020202020204" pitchFamily="34" charset="0"/>
+              </a:rPr>
+              <a:t>-56.75%</a:t>
+            </a:r>
+          </a:p>
+          <a:p>
+            <a:r>
+              <a:rPr lang="en-US" sz="2400" dirty="0">
+                <a:latin typeface="Aptos" panose="020B0004020202020204" pitchFamily="34" charset="0"/>
+              </a:rPr>
+              <a:t>95% </a:t>
+            </a:r>
+            <a:r>
+              <a:rPr lang="en-US" sz="2400" dirty="0" err="1">
+                <a:latin typeface="Aptos" panose="020B0004020202020204" pitchFamily="34" charset="0"/>
+              </a:rPr>
+              <a:t>VaR</a:t>
+            </a:r>
+            <a:r>
+              <a:rPr lang="en-US" sz="2400" dirty="0">
+                <a:latin typeface="Aptos" panose="020B0004020202020204" pitchFamily="34" charset="0"/>
+              </a:rPr>
+              <a:t> (daily): </a:t>
+            </a:r>
+            <a:r>
+              <a:rPr lang="en-US" sz="2400" b="1" dirty="0">
+                <a:latin typeface="Aptos" panose="020B0004020202020204" pitchFamily="34" charset="0"/>
+              </a:rPr>
+              <a:t>-1.84% </a:t>
+            </a:r>
+            <a:r>
+              <a:rPr lang="en-US" sz="2400" dirty="0">
+                <a:latin typeface="Aptos" panose="020B0004020202020204" pitchFamily="34" charset="0"/>
+              </a:rPr>
+              <a:t>| Benchmark: </a:t>
+            </a:r>
+            <a:r>
+              <a:rPr lang="en-US" sz="2400" b="1" dirty="0">
+                <a:latin typeface="Aptos" panose="020B0004020202020204" pitchFamily="34" charset="0"/>
+              </a:rPr>
+              <a:t>-1.81%</a:t>
+            </a:r>
+          </a:p>
+          <a:p>
+            <a:r>
+              <a:rPr lang="en-US" sz="2400" dirty="0">
+                <a:latin typeface="Aptos" panose="020B0004020202020204" pitchFamily="34" charset="0"/>
+              </a:rPr>
+              <a:t>95% CVaR (Expected daily Shortfall): </a:t>
+            </a:r>
+            <a:r>
+              <a:rPr lang="en-US" sz="2400" b="1" dirty="0">
+                <a:latin typeface="Aptos" panose="020B0004020202020204" pitchFamily="34" charset="0"/>
+              </a:rPr>
+              <a:t>-2.87% </a:t>
+            </a:r>
+            <a:r>
+              <a:rPr lang="en-US" sz="2400" dirty="0">
+                <a:latin typeface="Aptos" panose="020B0004020202020204" pitchFamily="34" charset="0"/>
+              </a:rPr>
+              <a:t>| Benchmark: </a:t>
+            </a:r>
+            <a:r>
+              <a:rPr lang="en-US" sz="2400" b="1" dirty="0">
+                <a:latin typeface="Aptos" panose="020B0004020202020204" pitchFamily="34" charset="0"/>
+              </a:rPr>
+              <a:t>-2.98%</a:t>
+            </a:r>
+          </a:p>
+        </p:txBody>
+      </p:sp>
+      <p:sp>
+        <p:nvSpPr>
+          <p:cNvPr id="3" name="TextBox 2">
+            <a:extLst>
+              <a:ext uri="{FF2B5EF4-FFF2-40B4-BE49-F238E27FC236}">
+                <a16:creationId xmlns:a16="http://schemas.microsoft.com/office/drawing/2014/main" id="{05C5A349-F906-E4F6-645B-5F095661990F}"/>
+              </a:ext>
+            </a:extLst>
+          </p:cNvPr>
+          <p:cNvSpPr txBox="1"/>
+          <p:nvPr/>
+        </p:nvSpPr>
+        <p:spPr>
+          <a:xfrm>
+            <a:off x="4288710" y="304799"/>
+            <a:ext cx="3614580" cy="523220"/>
+          </a:xfrm>
+          <a:prstGeom prst="rect">
+            <a:avLst/>
+          </a:prstGeom>
+          <a:noFill/>
+        </p:spPr>
+        <p:txBody>
+          <a:bodyPr wrap="none" rtlCol="0">
+            <a:spAutoFit/>
+          </a:bodyPr>
+          <a:lstStyle/>
+          <a:p>
+            <a:pPr algn="ctr"/>
+            <a:r>
+              <a:rPr lang="en-US" sz="2800" b="1" dirty="0">
+                <a:latin typeface="Aptos" panose="020B0004020202020204" pitchFamily="34" charset="0"/>
+              </a:rPr>
+              <a:t>Performance Metrics</a:t>
+            </a:r>
+          </a:p>
+        </p:txBody>
+      </p:sp>
+    </p:spTree>
+    <p:extLst>
+      <p:ext uri="{BB962C8B-B14F-4D97-AF65-F5344CB8AC3E}">
+        <p14:creationId xmlns:p14="http://schemas.microsoft.com/office/powerpoint/2010/main" val="1853070364"/>
+      </p:ext>
+    </p:extLst>
+  </p:cSld>
+  <p:clrMapOvr>
+    <a:masterClrMapping/>
+  </p:clrMapOvr>
+  <mc:AlternateContent xmlns:mc="http://schemas.openxmlformats.org/markup-compatibility/2006" xmlns:p14="http://schemas.microsoft.com/office/powerpoint/2010/main">
+    <mc:Choice Requires="p14">
+      <p:transition spd="slow" p14:dur="1500">
+        <p:pull/>
+      </p:transition>
+    </mc:Choice>
+    <mc:Fallback xmlns="">
+      <p:transition spd="slow">
+        <p:pull/>
+      </p:transition>
+    </mc:Fallback>
+  </mc:AlternateContent>
+</p:sld>
+</file>
+
+<file path=ppt/slides/slide12.xml><?xml version="1.0" encoding="utf-8"?>
+<p:sld xmlns:a="http://schemas.openxmlformats.org/drawingml/2006/main" xmlns:r="http://schemas.openxmlformats.org/officeDocument/2006/relationships" xmlns:p="http://schemas.openxmlformats.org/presentationml/2006/main">
+  <p:cSld>
+    <p:spTree>
+      <p:nvGrpSpPr>
+        <p:cNvPr id="1" name=""/>
+        <p:cNvGrpSpPr/>
+        <p:nvPr/>
+      </p:nvGrpSpPr>
+      <p:grpSpPr>
+        <a:xfrm>
+          <a:off x="0" y="0"/>
+          <a:ext cx="0" cy="0"/>
+          <a:chOff x="0" y="0"/>
+          <a:chExt cx="0" cy="0"/>
+        </a:xfrm>
+      </p:grpSpPr>
+      <p:sp>
+        <p:nvSpPr>
+          <p:cNvPr id="2" name="TextBox 1">
+            <a:extLst>
+              <a:ext uri="{FF2B5EF4-FFF2-40B4-BE49-F238E27FC236}">
+                <a16:creationId xmlns:a16="http://schemas.microsoft.com/office/drawing/2014/main" id="{616CBC8D-38A6-5761-7209-FD04A5A3AC10}"/>
+              </a:ext>
+            </a:extLst>
+          </p:cNvPr>
+          <p:cNvSpPr txBox="1"/>
+          <p:nvPr/>
+        </p:nvSpPr>
+        <p:spPr>
+          <a:xfrm>
+            <a:off x="1941443" y="2644170"/>
+            <a:ext cx="8309113" cy="1569660"/>
+          </a:xfrm>
+          <a:prstGeom prst="rect">
+            <a:avLst/>
+          </a:prstGeom>
+          <a:noFill/>
+        </p:spPr>
+        <p:txBody>
+          <a:bodyPr wrap="square" rtlCol="0">
+            <a:spAutoFit/>
+          </a:bodyPr>
+          <a:lstStyle/>
+          <a:p>
+            <a:pPr algn="ctr"/>
+            <a:r>
+              <a:rPr lang="en-US" sz="4800" b="1" dirty="0">
+                <a:latin typeface="Aptos" panose="020B0004020202020204" pitchFamily="34" charset="0"/>
+              </a:rPr>
+              <a:t>Stress Testing the Strategy in times of Crises</a:t>
+            </a:r>
+          </a:p>
+        </p:txBody>
+      </p:sp>
+    </p:spTree>
+    <p:extLst>
+      <p:ext uri="{BB962C8B-B14F-4D97-AF65-F5344CB8AC3E}">
+        <p14:creationId xmlns:p14="http://schemas.microsoft.com/office/powerpoint/2010/main" val="833001626"/>
+      </p:ext>
+    </p:extLst>
+  </p:cSld>
+  <p:clrMapOvr>
+    <a:masterClrMapping/>
+  </p:clrMapOvr>
+  <mc:AlternateContent xmlns:mc="http://schemas.openxmlformats.org/markup-compatibility/2006" xmlns:p14="http://schemas.microsoft.com/office/powerpoint/2010/main">
+    <mc:Choice Requires="p14">
+      <p:transition spd="slow" p14:dur="1500">
+        <p:pull/>
+      </p:transition>
+    </mc:Choice>
+    <mc:Fallback xmlns="">
+      <p:transition spd="slow">
+        <p:pull/>
+      </p:transition>
+    </mc:Fallback>
+  </mc:AlternateContent>
+</p:sld>
+</file>
+
+<file path=ppt/slides/slide13.xml><?xml version="1.0" encoding="utf-8"?>
+<p:sld xmlns:a="http://schemas.openxmlformats.org/drawingml/2006/main" xmlns:r="http://schemas.openxmlformats.org/officeDocument/2006/relationships" xmlns:p="http://schemas.openxmlformats.org/presentationml/2006/main">
+  <p:cSld>
+    <p:spTree>
+      <p:nvGrpSpPr>
+        <p:cNvPr id="1" name=""/>
+        <p:cNvGrpSpPr/>
+        <p:nvPr/>
+      </p:nvGrpSpPr>
+      <p:grpSpPr>
+        <a:xfrm>
+          <a:off x="0" y="0"/>
+          <a:ext cx="0" cy="0"/>
+          <a:chOff x="0" y="0"/>
+          <a:chExt cx="0" cy="0"/>
+        </a:xfrm>
+      </p:grpSpPr>
       <p:pic>
         <p:nvPicPr>
           <p:cNvPr id="3" name="Picture 2" descr="A graph on a black background&#10;&#10;AI-generated content may be incorrect.">
@@ -7595,7 +7957,7 @@
 </p:sld>
 </file>
 
-<file path=ppt/slides/slide12.xml><?xml version="1.0" encoding="utf-8"?>
+<file path=ppt/slides/slide14.xml><?xml version="1.0" encoding="utf-8"?>
 <p:sld xmlns:a="http://schemas.openxmlformats.org/drawingml/2006/main" xmlns:r="http://schemas.openxmlformats.org/officeDocument/2006/relationships" xmlns:p="http://schemas.openxmlformats.org/presentationml/2006/main">
   <p:cSld>
     <p:spTree>
@@ -7652,6 +8014,541 @@
     <p:extLst>
       <p:ext uri="{BB962C8B-B14F-4D97-AF65-F5344CB8AC3E}">
         <p14:creationId xmlns:p14="http://schemas.microsoft.com/office/powerpoint/2010/main" val="479521948"/>
+      </p:ext>
+    </p:extLst>
+  </p:cSld>
+  <p:clrMapOvr>
+    <a:masterClrMapping/>
+  </p:clrMapOvr>
+  <mc:AlternateContent xmlns:mc="http://schemas.openxmlformats.org/markup-compatibility/2006" xmlns:p14="http://schemas.microsoft.com/office/powerpoint/2010/main">
+    <mc:Choice Requires="p14">
+      <p:transition spd="slow" p14:dur="1500">
+        <p:pull/>
+      </p:transition>
+    </mc:Choice>
+    <mc:Fallback xmlns="">
+      <p:transition spd="slow">
+        <p:pull/>
+      </p:transition>
+    </mc:Fallback>
+  </mc:AlternateContent>
+</p:sld>
+</file>
+
+<file path=ppt/slides/slide15.xml><?xml version="1.0" encoding="utf-8"?>
+<p:sld xmlns:a="http://schemas.openxmlformats.org/drawingml/2006/main" xmlns:r="http://schemas.openxmlformats.org/officeDocument/2006/relationships" xmlns:p="http://schemas.openxmlformats.org/presentationml/2006/main">
+  <p:cSld>
+    <p:spTree>
+      <p:nvGrpSpPr>
+        <p:cNvPr id="1" name=""/>
+        <p:cNvGrpSpPr/>
+        <p:nvPr/>
+      </p:nvGrpSpPr>
+      <p:grpSpPr>
+        <a:xfrm>
+          <a:off x="0" y="0"/>
+          <a:ext cx="0" cy="0"/>
+          <a:chOff x="0" y="0"/>
+          <a:chExt cx="0" cy="0"/>
+        </a:xfrm>
+      </p:grpSpPr>
+      <p:sp>
+        <p:nvSpPr>
+          <p:cNvPr id="2" name="TextBox 1">
+            <a:extLst>
+              <a:ext uri="{FF2B5EF4-FFF2-40B4-BE49-F238E27FC236}">
+                <a16:creationId xmlns:a16="http://schemas.microsoft.com/office/drawing/2014/main" id="{CB2D0A2C-D804-8711-DB7C-B9D4B16C9C84}"/>
+              </a:ext>
+            </a:extLst>
+          </p:cNvPr>
+          <p:cNvSpPr txBox="1"/>
+          <p:nvPr/>
+        </p:nvSpPr>
+        <p:spPr>
+          <a:xfrm>
+            <a:off x="2955235" y="3013501"/>
+            <a:ext cx="6281530" cy="830997"/>
+          </a:xfrm>
+          <a:prstGeom prst="rect">
+            <a:avLst/>
+          </a:prstGeom>
+          <a:noFill/>
+        </p:spPr>
+        <p:txBody>
+          <a:bodyPr wrap="square" rtlCol="0">
+            <a:spAutoFit/>
+          </a:bodyPr>
+          <a:lstStyle/>
+          <a:p>
+            <a:pPr algn="ctr"/>
+            <a:r>
+              <a:rPr lang="en-US" sz="4800" b="1" dirty="0">
+                <a:latin typeface="Aptos" panose="020B0004020202020204" pitchFamily="34" charset="0"/>
+              </a:rPr>
+              <a:t>Is it Realistic?</a:t>
+            </a:r>
+          </a:p>
+        </p:txBody>
+      </p:sp>
+    </p:spTree>
+    <p:extLst>
+      <p:ext uri="{BB962C8B-B14F-4D97-AF65-F5344CB8AC3E}">
+        <p14:creationId xmlns:p14="http://schemas.microsoft.com/office/powerpoint/2010/main" val="4035062515"/>
+      </p:ext>
+    </p:extLst>
+  </p:cSld>
+  <p:clrMapOvr>
+    <a:masterClrMapping/>
+  </p:clrMapOvr>
+  <mc:AlternateContent xmlns:mc="http://schemas.openxmlformats.org/markup-compatibility/2006" xmlns:p14="http://schemas.microsoft.com/office/powerpoint/2010/main">
+    <mc:Choice Requires="p14">
+      <p:transition spd="slow" p14:dur="1500">
+        <p:pull/>
+      </p:transition>
+    </mc:Choice>
+    <mc:Fallback xmlns="">
+      <p:transition spd="slow">
+        <p:pull/>
+      </p:transition>
+    </mc:Fallback>
+  </mc:AlternateContent>
+</p:sld>
+</file>
+
+<file path=ppt/slides/slide16.xml><?xml version="1.0" encoding="utf-8"?>
+<p:sld xmlns:a="http://schemas.openxmlformats.org/drawingml/2006/main" xmlns:r="http://schemas.openxmlformats.org/officeDocument/2006/relationships" xmlns:p="http://schemas.openxmlformats.org/presentationml/2006/main">
+  <p:cSld>
+    <p:spTree>
+      <p:nvGrpSpPr>
+        <p:cNvPr id="1" name=""/>
+        <p:cNvGrpSpPr/>
+        <p:nvPr/>
+      </p:nvGrpSpPr>
+      <p:grpSpPr>
+        <a:xfrm>
+          <a:off x="0" y="0"/>
+          <a:ext cx="0" cy="0"/>
+          <a:chOff x="0" y="0"/>
+          <a:chExt cx="0" cy="0"/>
+        </a:xfrm>
+      </p:grpSpPr>
+      <p:sp>
+        <p:nvSpPr>
+          <p:cNvPr id="2" name="TextBox 1">
+            <a:extLst>
+              <a:ext uri="{FF2B5EF4-FFF2-40B4-BE49-F238E27FC236}">
+                <a16:creationId xmlns:a16="http://schemas.microsoft.com/office/drawing/2014/main" id="{E98644FD-0B70-CA7D-A674-10387ECE2F91}"/>
+              </a:ext>
+            </a:extLst>
+          </p:cNvPr>
+          <p:cNvSpPr txBox="1"/>
+          <p:nvPr/>
+        </p:nvSpPr>
+        <p:spPr>
+          <a:xfrm>
+            <a:off x="1020418" y="2459504"/>
+            <a:ext cx="7275443" cy="1938992"/>
+          </a:xfrm>
+          <a:prstGeom prst="rect">
+            <a:avLst/>
+          </a:prstGeom>
+          <a:noFill/>
+        </p:spPr>
+        <p:txBody>
+          <a:bodyPr wrap="square" rtlCol="0">
+            <a:spAutoFit/>
+          </a:bodyPr>
+          <a:lstStyle/>
+          <a:p>
+            <a:pPr marL="285750" indent="-285750">
+              <a:buFont typeface="Arial" panose="020B0604020202020204" pitchFamily="34" charset="0"/>
+              <a:buChar char="•"/>
+            </a:pPr>
+            <a:r>
+              <a:rPr lang="en-US" sz="2400" b="1" dirty="0">
+                <a:latin typeface="Aptos" panose="020B0004020202020204" pitchFamily="34" charset="0"/>
+              </a:rPr>
+              <a:t>Liquidity</a:t>
+            </a:r>
+            <a:r>
+              <a:rPr lang="en-US" sz="2400" dirty="0">
+                <a:latin typeface="Aptos" panose="020B0004020202020204" pitchFamily="34" charset="0"/>
+              </a:rPr>
+              <a:t> (S&amp;P 500 Stocks)</a:t>
+            </a:r>
+          </a:p>
+          <a:p>
+            <a:pPr marL="285750" indent="-285750">
+              <a:buFont typeface="Arial" panose="020B0604020202020204" pitchFamily="34" charset="0"/>
+              <a:buChar char="•"/>
+            </a:pPr>
+            <a:r>
+              <a:rPr lang="en-US" sz="2400" b="1" dirty="0">
+                <a:latin typeface="Aptos" panose="020B0004020202020204" pitchFamily="34" charset="0"/>
+              </a:rPr>
+              <a:t>Academically Proven Anomalies </a:t>
+            </a:r>
+            <a:r>
+              <a:rPr lang="en-US" sz="2400" dirty="0">
+                <a:latin typeface="Aptos" panose="020B0004020202020204" pitchFamily="34" charset="0"/>
+              </a:rPr>
+              <a:t>(Fama &amp; French (1992), </a:t>
+            </a:r>
+            <a:r>
+              <a:rPr lang="en-US" sz="2400" dirty="0" err="1">
+                <a:latin typeface="Aptos" panose="020B0004020202020204" pitchFamily="34" charset="0"/>
+              </a:rPr>
+              <a:t>Asness</a:t>
+            </a:r>
+            <a:r>
+              <a:rPr lang="en-US" sz="2400" dirty="0">
+                <a:latin typeface="Aptos" panose="020B0004020202020204" pitchFamily="34" charset="0"/>
+              </a:rPr>
+              <a:t> et al. (2013) (2019))</a:t>
+            </a:r>
+          </a:p>
+          <a:p>
+            <a:pPr marL="285750" indent="-285750">
+              <a:buFont typeface="Arial" panose="020B0604020202020204" pitchFamily="34" charset="0"/>
+              <a:buChar char="•"/>
+            </a:pPr>
+            <a:r>
+              <a:rPr lang="en-US" sz="2400" b="1" dirty="0">
+                <a:latin typeface="Aptos" panose="020B0004020202020204" pitchFamily="34" charset="0"/>
+              </a:rPr>
+              <a:t>Minimal Trading </a:t>
+            </a:r>
+            <a:r>
+              <a:rPr lang="en-US" sz="2400" b="1" dirty="0" err="1">
+                <a:latin typeface="Aptos" panose="020B0004020202020204" pitchFamily="34" charset="0"/>
+              </a:rPr>
+              <a:t>Commisions</a:t>
+            </a:r>
+            <a:r>
+              <a:rPr lang="en-US" sz="2400" b="1" dirty="0">
+                <a:latin typeface="Aptos" panose="020B0004020202020204" pitchFamily="34" charset="0"/>
+              </a:rPr>
+              <a:t> </a:t>
+            </a:r>
+            <a:r>
+              <a:rPr lang="en-US" sz="2400" dirty="0">
+                <a:latin typeface="Aptos" panose="020B0004020202020204" pitchFamily="34" charset="0"/>
+              </a:rPr>
+              <a:t>(Semi-Annual Rebalancing)</a:t>
+            </a:r>
+          </a:p>
+        </p:txBody>
+      </p:sp>
+      <p:sp>
+        <p:nvSpPr>
+          <p:cNvPr id="3" name="TextBox 2">
+            <a:extLst>
+              <a:ext uri="{FF2B5EF4-FFF2-40B4-BE49-F238E27FC236}">
+                <a16:creationId xmlns:a16="http://schemas.microsoft.com/office/drawing/2014/main" id="{83D3E21C-5EB4-9BBF-F71C-531C41F0BB3B}"/>
+              </a:ext>
+            </a:extLst>
+          </p:cNvPr>
+          <p:cNvSpPr txBox="1"/>
+          <p:nvPr/>
+        </p:nvSpPr>
+        <p:spPr>
+          <a:xfrm>
+            <a:off x="4983259" y="490331"/>
+            <a:ext cx="2225481" cy="584775"/>
+          </a:xfrm>
+          <a:prstGeom prst="rect">
+            <a:avLst/>
+          </a:prstGeom>
+          <a:noFill/>
+        </p:spPr>
+        <p:txBody>
+          <a:bodyPr wrap="none" rtlCol="0">
+            <a:spAutoFit/>
+          </a:bodyPr>
+          <a:lstStyle/>
+          <a:p>
+            <a:r>
+              <a:rPr lang="en-US" sz="3200" b="1" dirty="0">
+                <a:latin typeface="Aptos" panose="020B0004020202020204" pitchFamily="34" charset="0"/>
+              </a:rPr>
+              <a:t>Real World</a:t>
+            </a:r>
+          </a:p>
+        </p:txBody>
+      </p:sp>
+    </p:spTree>
+    <p:extLst>
+      <p:ext uri="{BB962C8B-B14F-4D97-AF65-F5344CB8AC3E}">
+        <p14:creationId xmlns:p14="http://schemas.microsoft.com/office/powerpoint/2010/main" val="4062003524"/>
+      </p:ext>
+    </p:extLst>
+  </p:cSld>
+  <p:clrMapOvr>
+    <a:masterClrMapping/>
+  </p:clrMapOvr>
+  <mc:AlternateContent xmlns:mc="http://schemas.openxmlformats.org/markup-compatibility/2006" xmlns:p14="http://schemas.microsoft.com/office/powerpoint/2010/main">
+    <mc:Choice Requires="p14">
+      <p:transition spd="slow" p14:dur="1500">
+        <p:pull/>
+      </p:transition>
+    </mc:Choice>
+    <mc:Fallback xmlns="">
+      <p:transition spd="slow">
+        <p:pull/>
+      </p:transition>
+    </mc:Fallback>
+  </mc:AlternateContent>
+</p:sld>
+</file>
+
+<file path=ppt/slides/slide17.xml><?xml version="1.0" encoding="utf-8"?>
+<p:sld xmlns:a="http://schemas.openxmlformats.org/drawingml/2006/main" xmlns:r="http://schemas.openxmlformats.org/officeDocument/2006/relationships" xmlns:p="http://schemas.openxmlformats.org/presentationml/2006/main">
+  <p:cSld>
+    <p:spTree>
+      <p:nvGrpSpPr>
+        <p:cNvPr id="1" name=""/>
+        <p:cNvGrpSpPr/>
+        <p:nvPr/>
+      </p:nvGrpSpPr>
+      <p:grpSpPr>
+        <a:xfrm>
+          <a:off x="0" y="0"/>
+          <a:ext cx="0" cy="0"/>
+          <a:chOff x="0" y="0"/>
+          <a:chExt cx="0" cy="0"/>
+        </a:xfrm>
+      </p:grpSpPr>
+      <p:sp>
+        <p:nvSpPr>
+          <p:cNvPr id="2" name="TextBox 1">
+            <a:extLst>
+              <a:ext uri="{FF2B5EF4-FFF2-40B4-BE49-F238E27FC236}">
+                <a16:creationId xmlns:a16="http://schemas.microsoft.com/office/drawing/2014/main" id="{0907F16F-8618-E488-5A2D-45DE734A8426}"/>
+              </a:ext>
+            </a:extLst>
+          </p:cNvPr>
+          <p:cNvSpPr txBox="1"/>
+          <p:nvPr/>
+        </p:nvSpPr>
+        <p:spPr>
+          <a:xfrm>
+            <a:off x="2757203" y="728870"/>
+            <a:ext cx="6677597" cy="830997"/>
+          </a:xfrm>
+          <a:prstGeom prst="rect">
+            <a:avLst/>
+          </a:prstGeom>
+          <a:noFill/>
+        </p:spPr>
+        <p:txBody>
+          <a:bodyPr wrap="none" rtlCol="0">
+            <a:spAutoFit/>
+          </a:bodyPr>
+          <a:lstStyle/>
+          <a:p>
+            <a:pPr algn="ctr"/>
+            <a:r>
+              <a:rPr lang="en-US" sz="4800" b="1" dirty="0">
+                <a:latin typeface="Aptos" panose="020B0004020202020204" pitchFamily="34" charset="0"/>
+              </a:rPr>
+              <a:t>Thank you for your time</a:t>
+            </a:r>
+          </a:p>
+        </p:txBody>
+      </p:sp>
+      <p:sp>
+        <p:nvSpPr>
+          <p:cNvPr id="3" name="TextBox 2">
+            <a:extLst>
+              <a:ext uri="{FF2B5EF4-FFF2-40B4-BE49-F238E27FC236}">
+                <a16:creationId xmlns:a16="http://schemas.microsoft.com/office/drawing/2014/main" id="{53F9E714-8DF4-6854-F113-3B5E20BC9F34}"/>
+              </a:ext>
+            </a:extLst>
+          </p:cNvPr>
+          <p:cNvSpPr txBox="1"/>
+          <p:nvPr/>
+        </p:nvSpPr>
+        <p:spPr>
+          <a:xfrm>
+            <a:off x="463826" y="3244334"/>
+            <a:ext cx="4664765" cy="923330"/>
+          </a:xfrm>
+          <a:prstGeom prst="rect">
+            <a:avLst/>
+          </a:prstGeom>
+          <a:noFill/>
+        </p:spPr>
+        <p:txBody>
+          <a:bodyPr wrap="square" rtlCol="0">
+            <a:spAutoFit/>
+          </a:bodyPr>
+          <a:lstStyle/>
+          <a:p>
+            <a:r>
+              <a:rPr lang="en-US" dirty="0">
+                <a:latin typeface="Aptos" panose="020B0004020202020204" pitchFamily="34" charset="0"/>
+              </a:rPr>
+              <a:t>All the </a:t>
+            </a:r>
+            <a:r>
+              <a:rPr lang="en-US" b="1" dirty="0">
+                <a:latin typeface="Aptos" panose="020B0004020202020204" pitchFamily="34" charset="0"/>
+              </a:rPr>
+              <a:t>updated</a:t>
+            </a:r>
+            <a:r>
+              <a:rPr lang="en-US" dirty="0">
+                <a:latin typeface="Aptos" panose="020B0004020202020204" pitchFamily="34" charset="0"/>
+              </a:rPr>
+              <a:t> code can be found at: </a:t>
+            </a:r>
+            <a:r>
+              <a:rPr lang="en-US" dirty="0">
+                <a:latin typeface="Aptos" panose="020B0004020202020204" pitchFamily="34" charset="0"/>
+                <a:hlinkClick r:id="rId2"/>
+              </a:rPr>
+              <a:t>https://github.com/GeorgeMoschovis/Value-Quality-Momentum-Strategy </a:t>
+            </a:r>
+            <a:endParaRPr lang="en-US" dirty="0">
+              <a:latin typeface="Aptos" panose="020B0004020202020204" pitchFamily="34" charset="0"/>
+            </a:endParaRPr>
+          </a:p>
+        </p:txBody>
+      </p:sp>
+      <p:sp>
+        <p:nvSpPr>
+          <p:cNvPr id="5" name="TextBox 4">
+            <a:extLst>
+              <a:ext uri="{FF2B5EF4-FFF2-40B4-BE49-F238E27FC236}">
+                <a16:creationId xmlns:a16="http://schemas.microsoft.com/office/drawing/2014/main" id="{B54B18FC-0EDC-0B09-7A43-C26D39B91CEB}"/>
+              </a:ext>
+            </a:extLst>
+          </p:cNvPr>
+          <p:cNvSpPr txBox="1"/>
+          <p:nvPr/>
+        </p:nvSpPr>
+        <p:spPr>
+          <a:xfrm>
+            <a:off x="463826" y="4898192"/>
+            <a:ext cx="6096000" cy="830997"/>
+          </a:xfrm>
+          <a:prstGeom prst="rect">
+            <a:avLst/>
+          </a:prstGeom>
+          <a:noFill/>
+        </p:spPr>
+        <p:txBody>
+          <a:bodyPr wrap="square">
+            <a:spAutoFit/>
+          </a:bodyPr>
+          <a:lstStyle/>
+          <a:p>
+            <a:r>
+              <a:rPr lang="de-DE" sz="2400" b="1" dirty="0">
+                <a:latin typeface="Aptos" panose="020B0004020202020204" pitchFamily="34" charset="0"/>
+              </a:rPr>
+              <a:t>George Moschovis &amp; Florent </a:t>
+            </a:r>
+            <a:r>
+              <a:rPr lang="de-DE" sz="2400" b="1" dirty="0" err="1">
+                <a:latin typeface="Aptos" panose="020B0004020202020204" pitchFamily="34" charset="0"/>
+              </a:rPr>
+              <a:t>Yigbe</a:t>
+            </a:r>
+            <a:endParaRPr lang="de-DE" sz="2400" b="1" dirty="0">
+              <a:latin typeface="Aptos" panose="020B0004020202020204" pitchFamily="34" charset="0"/>
+            </a:endParaRPr>
+          </a:p>
+          <a:p>
+            <a:r>
+              <a:rPr lang="de-DE" sz="2400" b="1" dirty="0">
+                <a:latin typeface="Aptos" panose="020B0004020202020204" pitchFamily="34" charset="0"/>
+              </a:rPr>
+              <a:t>G_5 Gamma Gurus</a:t>
+            </a:r>
+            <a:endParaRPr lang="fr-FR" sz="2400" b="1" dirty="0">
+              <a:latin typeface="Aptos" panose="020B0004020202020204" pitchFamily="34" charset="0"/>
+            </a:endParaRPr>
+          </a:p>
+        </p:txBody>
+      </p:sp>
+      <p:pic>
+        <p:nvPicPr>
+          <p:cNvPr id="11" name="Picture 10" descr="A black and white logo&#10;&#10;AI-generated content may be incorrect.">
+            <a:extLst>
+              <a:ext uri="{FF2B5EF4-FFF2-40B4-BE49-F238E27FC236}">
+                <a16:creationId xmlns:a16="http://schemas.microsoft.com/office/drawing/2014/main" id="{3F1950A6-868E-740C-F579-923F68BF23A3}"/>
+              </a:ext>
+            </a:extLst>
+          </p:cNvPr>
+          <p:cNvPicPr>
+            <a:picLocks noChangeAspect="1"/>
+          </p:cNvPicPr>
+          <p:nvPr/>
+        </p:nvPicPr>
+        <p:blipFill>
+          <a:blip r:embed="rId3">
+            <a:extLst>
+              <a:ext uri="{28A0092B-C50C-407E-A947-70E740481C1C}">
+                <a14:useLocalDpi xmlns:a14="http://schemas.microsoft.com/office/drawing/2010/main" val="0"/>
+              </a:ext>
+            </a:extLst>
+          </a:blip>
+          <a:srcRect l="50207"/>
+          <a:stretch>
+            <a:fillRect/>
+          </a:stretch>
+        </p:blipFill>
+        <p:spPr>
+          <a:xfrm>
+            <a:off x="5428242" y="3035468"/>
+            <a:ext cx="1335516" cy="1341061"/>
+          </a:xfrm>
+          <a:prstGeom prst="rect">
+            <a:avLst/>
+          </a:prstGeom>
+        </p:spPr>
+      </p:pic>
+      <p:pic>
+        <p:nvPicPr>
+          <p:cNvPr id="12" name="Picture 11" descr="A white silhouette of a deer&#10;&#10;AI-generated content may be incorrect.">
+            <a:extLst>
+              <a:ext uri="{FF2B5EF4-FFF2-40B4-BE49-F238E27FC236}">
+                <a16:creationId xmlns:a16="http://schemas.microsoft.com/office/drawing/2014/main" id="{D5DF4C93-10FE-EF53-FA29-72632E3BF3DC}"/>
+              </a:ext>
+            </a:extLst>
+          </p:cNvPr>
+          <p:cNvPicPr>
+            <a:picLocks noChangeAspect="1"/>
+          </p:cNvPicPr>
+          <p:nvPr/>
+        </p:nvPicPr>
+        <p:blipFill>
+          <a:blip r:embed="rId4">
+            <a:extLst>
+              <a:ext uri="{28A0092B-C50C-407E-A947-70E740481C1C}">
+                <a14:useLocalDpi xmlns:a14="http://schemas.microsoft.com/office/drawing/2010/main" val="0"/>
+              </a:ext>
+            </a:extLst>
+          </a:blip>
+          <a:stretch>
+            <a:fillRect/>
+          </a:stretch>
+        </p:blipFill>
+        <p:spPr>
+          <a:xfrm>
+            <a:off x="5428242" y="4820866"/>
+            <a:ext cx="1335516" cy="1335516"/>
+          </a:xfrm>
+          <a:prstGeom prst="rect">
+            <a:avLst/>
+          </a:prstGeom>
+        </p:spPr>
+      </p:pic>
+    </p:spTree>
+    <p:extLst>
+      <p:ext uri="{BB962C8B-B14F-4D97-AF65-F5344CB8AC3E}">
+        <p14:creationId xmlns:p14="http://schemas.microsoft.com/office/powerpoint/2010/main" val="1836487670"/>
       </p:ext>
     </p:extLst>
   </p:cSld>
@@ -12185,7 +13082,7 @@
         </p:nvSpPr>
         <p:spPr>
           <a:xfrm>
-            <a:off x="1113824" y="2338840"/>
+            <a:off x="965012" y="2240982"/>
             <a:ext cx="7214617" cy="2376035"/>
           </a:xfrm>
           <a:prstGeom prst="rect">
@@ -12198,6 +13095,40 @@
             <a:spAutoFit/>
           </a:bodyPr>
           <a:lstStyle/>
+          <a:p>
+            <a:pPr marL="342900" indent="-342900">
+              <a:lnSpc>
+                <a:spcPct val="115000"/>
+              </a:lnSpc>
+              <a:spcAft>
+                <a:spcPts val="800"/>
+              </a:spcAft>
+              <a:buFont typeface="Arial" panose="020B0604020202020204" pitchFamily="34" charset="0"/>
+              <a:buChar char="•"/>
+            </a:pPr>
+            <a:r>
+              <a:rPr lang="en-US" sz="2400" b="1" kern="100" dirty="0">
+                <a:latin typeface="Aptos" panose="020B0004020202020204" pitchFamily="34" charset="0"/>
+                <a:ea typeface="Aptos" panose="020B0004020202020204" pitchFamily="34" charset="0"/>
+                <a:cs typeface="Times New Roman" panose="02020603050405020304" pitchFamily="18" charset="0"/>
+              </a:rPr>
+              <a:t>Momentum filter: </a:t>
+            </a:r>
+            <a:r>
+              <a:rPr lang="en-US" sz="2400" kern="100" dirty="0">
+                <a:latin typeface="Aptos" panose="020B0004020202020204" pitchFamily="34" charset="0"/>
+                <a:ea typeface="Aptos" panose="020B0004020202020204" pitchFamily="34" charset="0"/>
+                <a:cs typeface="Times New Roman" panose="02020603050405020304" pitchFamily="18" charset="0"/>
+              </a:rPr>
+              <a:t>Only select stocks with 	positive 3 and 12-month price momentum.</a:t>
+            </a:r>
+            <a:endParaRPr lang="en-US" sz="2400" b="1" kern="100" dirty="0">
+              <a:effectLst/>
+              <a:latin typeface="Aptos" panose="020B0004020202020204" pitchFamily="34" charset="0"/>
+              <a:ea typeface="Aptos" panose="020B0004020202020204" pitchFamily="34" charset="0"/>
+              <a:cs typeface="Times New Roman" panose="02020603050405020304" pitchFamily="18" charset="0"/>
+            </a:endParaRPr>
+          </a:p>
           <a:p>
             <a:pPr marL="342900" indent="-342900">
               <a:lnSpc>
@@ -12266,46 +13197,6 @@
                 <a:cs typeface="Times New Roman" panose="02020603050405020304" pitchFamily="18" charset="0"/>
               </a:rPr>
               <a:t>High ROE, low debt/equity</a:t>
-            </a:r>
-            <a:endParaRPr lang="fr-FR" sz="2400" kern="100" dirty="0">
-              <a:effectLst/>
-              <a:latin typeface="Aptos" panose="020B0004020202020204" pitchFamily="34" charset="0"/>
-              <a:ea typeface="Aptos" panose="020B0004020202020204" pitchFamily="34" charset="0"/>
-              <a:cs typeface="Times New Roman" panose="02020603050405020304" pitchFamily="18" charset="0"/>
-            </a:endParaRPr>
-          </a:p>
-          <a:p>
-            <a:pPr marL="342900" lvl="0" indent="-342900">
-              <a:lnSpc>
-                <a:spcPct val="115000"/>
-              </a:lnSpc>
-              <a:spcAft>
-                <a:spcPts val="800"/>
-              </a:spcAft>
-              <a:buSzPts val="1000"/>
-              <a:buFont typeface="Arial" panose="020B0604020202020204" pitchFamily="34" charset="0"/>
-              <a:buChar char="•"/>
-              <a:tabLst>
-                <a:tab pos="457200" algn="l"/>
-              </a:tabLst>
-            </a:pPr>
-            <a:r>
-              <a:rPr lang="en-US" sz="2400" b="1" kern="100" dirty="0">
-                <a:effectLst/>
-                <a:latin typeface="Aptos" panose="020B0004020202020204" pitchFamily="34" charset="0"/>
-                <a:ea typeface="Aptos" panose="020B0004020202020204" pitchFamily="34" charset="0"/>
-                <a:cs typeface="Times New Roman" panose="02020603050405020304" pitchFamily="18" charset="0"/>
-              </a:rPr>
-              <a:t>Momentum filter: </a:t>
-            </a:r>
-            <a:r>
-              <a:rPr lang="en-US" sz="2400" kern="100" dirty="0">
-                <a:effectLst/>
-                <a:latin typeface="Aptos" panose="020B0004020202020204" pitchFamily="34" charset="0"/>
-                <a:ea typeface="Aptos" panose="020B0004020202020204" pitchFamily="34" charset="0"/>
-                <a:cs typeface="Times New Roman" panose="02020603050405020304" pitchFamily="18" charset="0"/>
-              </a:rPr>
-              <a:t>Only select stocks with 	positive 3 and 12-month price momentum.</a:t>
             </a:r>
             <a:endParaRPr lang="fr-FR" sz="2400" kern="100" dirty="0">
               <a:effectLst/>
@@ -12413,6 +13304,87 @@
           </a:prstGeom>
         </p:spPr>
       </p:pic>
+      <p:sp>
+        <p:nvSpPr>
+          <p:cNvPr id="4" name="Right Brace 3">
+            <a:extLst>
+              <a:ext uri="{FF2B5EF4-FFF2-40B4-BE49-F238E27FC236}">
+                <a16:creationId xmlns:a16="http://schemas.microsoft.com/office/drawing/2014/main" id="{C67E2DF5-659F-94F7-A322-5E0D8CA74164}"/>
+              </a:ext>
+            </a:extLst>
+          </p:cNvPr>
+          <p:cNvSpPr/>
+          <p:nvPr/>
+        </p:nvSpPr>
+        <p:spPr>
+          <a:xfrm>
+            <a:off x="7712764" y="3220278"/>
+            <a:ext cx="297624" cy="1007166"/>
+          </a:xfrm>
+          <a:prstGeom prst="rightBrace">
+            <a:avLst/>
+          </a:prstGeom>
+        </p:spPr>
+        <p:style>
+          <a:lnRef idx="1">
+            <a:schemeClr val="accent1"/>
+          </a:lnRef>
+          <a:fillRef idx="0">
+            <a:schemeClr val="accent1"/>
+          </a:fillRef>
+          <a:effectRef idx="0">
+            <a:schemeClr val="accent1"/>
+          </a:effectRef>
+          <a:fontRef idx="minor">
+            <a:schemeClr val="tx1"/>
+          </a:fontRef>
+        </p:style>
+        <p:txBody>
+          <a:bodyPr rtlCol="0" anchor="ctr"/>
+          <a:lstStyle/>
+          <a:p>
+            <a:pPr algn="ctr"/>
+            <a:endParaRPr lang="en-US"/>
+          </a:p>
+        </p:txBody>
+      </p:sp>
+      <p:sp>
+        <p:nvSpPr>
+          <p:cNvPr id="6" name="TextBox 5">
+            <a:extLst>
+              <a:ext uri="{FF2B5EF4-FFF2-40B4-BE49-F238E27FC236}">
+                <a16:creationId xmlns:a16="http://schemas.microsoft.com/office/drawing/2014/main" id="{C82282A7-1AB9-2304-85BD-0B8DCC8007FE}"/>
+              </a:ext>
+            </a:extLst>
+          </p:cNvPr>
+          <p:cNvSpPr txBox="1"/>
+          <p:nvPr/>
+        </p:nvSpPr>
+        <p:spPr>
+          <a:xfrm>
+            <a:off x="8179629" y="3123696"/>
+            <a:ext cx="2276336" cy="1200329"/>
+          </a:xfrm>
+          <a:prstGeom prst="rect">
+            <a:avLst/>
+          </a:prstGeom>
+          <a:noFill/>
+        </p:spPr>
+        <p:txBody>
+          <a:bodyPr wrap="square" rtlCol="0">
+            <a:spAutoFit/>
+          </a:bodyPr>
+          <a:lstStyle/>
+          <a:p>
+            <a:r>
+              <a:rPr lang="en-US" sz="2400" b="1" dirty="0">
+                <a:latin typeface="Aptos" panose="020B0004020202020204" pitchFamily="34" charset="0"/>
+              </a:rPr>
+              <a:t>Composite Score to rank the stocks</a:t>
+            </a:r>
+          </a:p>
+        </p:txBody>
+      </p:sp>
     </p:spTree>
     <p:extLst>
       <p:ext uri="{BB962C8B-B14F-4D97-AF65-F5344CB8AC3E}">
@@ -12534,6 +13506,105 @@
                       </p:childTnLst>
                     </p:cTn>
                   </p:par>
+                  <p:par>
+                    <p:cTn id="9" fill="hold">
+                      <p:stCondLst>
+                        <p:cond delay="indefinite"/>
+                      </p:stCondLst>
+                      <p:childTnLst>
+                        <p:par>
+                          <p:cTn id="10" fill="hold">
+                            <p:stCondLst>
+                              <p:cond delay="0"/>
+                            </p:stCondLst>
+                            <p:childTnLst>
+                              <p:par>
+                                <p:cTn id="11" presetID="42" presetClass="entr" presetSubtype="0" fill="hold" grpId="0" nodeType="clickEffect">
+                                  <p:stCondLst>
+                                    <p:cond delay="0"/>
+                                  </p:stCondLst>
+                                  <p:childTnLst>
+                                    <p:set>
+                                      <p:cBhvr>
+                                        <p:cTn id="12" dur="1" fill="hold">
+                                          <p:stCondLst>
+                                            <p:cond delay="0"/>
+                                          </p:stCondLst>
+                                        </p:cTn>
+                                        <p:tgtEl>
+                                          <p:spTgt spid="6"/>
+                                        </p:tgtEl>
+                                        <p:attrNameLst>
+                                          <p:attrName>style.visibility</p:attrName>
+                                        </p:attrNameLst>
+                                      </p:cBhvr>
+                                      <p:to>
+                                        <p:strVal val="visible"/>
+                                      </p:to>
+                                    </p:set>
+                                    <p:animEffect transition="in" filter="fade">
+                                      <p:cBhvr>
+                                        <p:cTn id="13" dur="1000"/>
+                                        <p:tgtEl>
+                                          <p:spTgt spid="6"/>
+                                        </p:tgtEl>
+                                      </p:cBhvr>
+                                    </p:animEffect>
+                                    <p:anim calcmode="lin" valueType="num">
+                                      <p:cBhvr>
+                                        <p:cTn id="14" dur="1000" fill="hold"/>
+                                        <p:tgtEl>
+                                          <p:spTgt spid="6"/>
+                                        </p:tgtEl>
+                                        <p:attrNameLst>
+                                          <p:attrName>ppt_x</p:attrName>
+                                        </p:attrNameLst>
+                                      </p:cBhvr>
+                                      <p:tavLst>
+                                        <p:tav tm="0">
+                                          <p:val>
+                                            <p:strVal val="#ppt_x"/>
+                                          </p:val>
+                                        </p:tav>
+                                        <p:tav tm="100000">
+                                          <p:val>
+                                            <p:strVal val="#ppt_x"/>
+                                          </p:val>
+                                        </p:tav>
+                                      </p:tavLst>
+                                    </p:anim>
+                                    <p:anim calcmode="lin" valueType="num">
+                                      <p:cBhvr>
+                                        <p:cTn id="15" dur="1000" fill="hold"/>
+                                        <p:tgtEl>
+                                          <p:spTgt spid="6"/>
+                                        </p:tgtEl>
+                                        <p:attrNameLst>
+                                          <p:attrName>ppt_y</p:attrName>
+                                        </p:attrNameLst>
+                                      </p:cBhvr>
+                                      <p:tavLst>
+                                        <p:tav tm="0">
+                                          <p:val>
+                                            <p:strVal val="#ppt_y+.1"/>
+                                          </p:val>
+                                        </p:tav>
+                                        <p:tav tm="100000">
+                                          <p:val>
+                                            <p:strVal val="#ppt_y"/>
+                                          </p:val>
+                                        </p:tav>
+                                      </p:tavLst>
+                                    </p:anim>
+                                  </p:childTnLst>
+                                </p:cTn>
+                              </p:par>
+                            </p:childTnLst>
+                          </p:cTn>
+                        </p:par>
+                      </p:childTnLst>
+                    </p:cTn>
+                  </p:par>
                 </p:childTnLst>
               </p:cTn>
               <p:prevCondLst>
@@ -12557,6 +13628,7 @@
     </p:tnLst>
     <p:bldLst>
       <p:bldP spid="2" grpId="0"/>
+      <p:bldP spid="6" grpId="0"/>
     </p:bldLst>
   </p:timing>
 </p:sld>
@@ -13446,10 +14518,10 @@
       </p:grpSpPr>
       <p:sp>
         <p:nvSpPr>
-          <p:cNvPr id="2" name="TextBox 1">
+          <p:cNvPr id="4" name="TextBox 3">
             <a:extLst>
               <a:ext uri="{FF2B5EF4-FFF2-40B4-BE49-F238E27FC236}">
-                <a16:creationId xmlns:a16="http://schemas.microsoft.com/office/drawing/2014/main" id="{0C0E56C4-589C-9FE6-2F51-89E75523B498}"/>
+                <a16:creationId xmlns:a16="http://schemas.microsoft.com/office/drawing/2014/main" id="{ECF369F8-A45E-A725-B2B9-BCAFAADCD144}"/>
               </a:ext>
             </a:extLst>
           </p:cNvPr>
@@ -13458,8 +14530,8 @@
         </p:nvSpPr>
         <p:spPr>
           <a:xfrm>
-            <a:off x="1147482" y="1999681"/>
-            <a:ext cx="4948518" cy="3161891"/>
+            <a:off x="4219911" y="458369"/>
+            <a:ext cx="3752178" cy="523220"/>
           </a:xfrm>
           <a:prstGeom prst="rect">
             <a:avLst/>
@@ -13472,129 +14544,34 @@
           </a:bodyPr>
           <a:lstStyle/>
           <a:p>
-            <a:pPr marL="285750" indent="-285750">
-              <a:lnSpc>
-                <a:spcPct val="115000"/>
-              </a:lnSpc>
-              <a:spcAft>
-                <a:spcPts val="800"/>
-              </a:spcAft>
-              <a:buFont typeface="Arial" panose="020B0604020202020204" pitchFamily="34" charset="0"/>
-              <a:buChar char="•"/>
-            </a:pPr>
-            <a:r>
-              <a:rPr lang="en-US" sz="1800" kern="100" dirty="0">
-                <a:effectLst/>
+            <a:pPr algn="ctr"/>
+            <a:r>
+              <a:rPr lang="de-DE" sz="2800" b="1" dirty="0">
                 <a:latin typeface="Aptos" panose="020B0004020202020204" pitchFamily="34" charset="0"/>
-                <a:ea typeface="Aptos" panose="020B0004020202020204" pitchFamily="34" charset="0"/>
-                <a:cs typeface="Times New Roman" panose="02020603050405020304" pitchFamily="18" charset="0"/>
               </a:rPr>
-              <a:t>Stop-loss: deterioration in fundamentals.</a:t>
-            </a:r>
-          </a:p>
-          <a:p>
-            <a:pPr>
-              <a:lnSpc>
-                <a:spcPct val="115000"/>
-              </a:lnSpc>
-              <a:spcAft>
-                <a:spcPts val="800"/>
-              </a:spcAft>
-            </a:pPr>
-            <a:endParaRPr lang="fr-FR" kern="100" dirty="0">
-              <a:latin typeface="Aptos" panose="020B0004020202020204" pitchFamily="34" charset="0"/>
-              <a:ea typeface="Aptos" panose="020B0004020202020204" pitchFamily="34" charset="0"/>
-              <a:cs typeface="Times New Roman" panose="02020603050405020304" pitchFamily="18" charset="0"/>
-            </a:endParaRPr>
-          </a:p>
-          <a:p>
-            <a:pPr marL="285750" indent="-285750">
-              <a:lnSpc>
-                <a:spcPct val="115000"/>
-              </a:lnSpc>
-              <a:spcAft>
-                <a:spcPts val="800"/>
-              </a:spcAft>
-              <a:buFont typeface="Arial" panose="020B0604020202020204" pitchFamily="34" charset="0"/>
-              <a:buChar char="•"/>
-            </a:pPr>
-            <a:r>
-              <a:rPr lang="el-GR" sz="1800" kern="100" dirty="0">
-                <a:effectLst/>
+              <a:t>Potential </a:t>
+            </a:r>
+            <a:r>
+              <a:rPr lang="de-DE" sz="2800" b="1" dirty="0" err="1">
                 <a:latin typeface="Aptos" panose="020B0004020202020204" pitchFamily="34" charset="0"/>
-                <a:ea typeface="Aptos" panose="020B0004020202020204" pitchFamily="34" charset="0"/>
-                <a:cs typeface="Times New Roman" panose="02020603050405020304" pitchFamily="18" charset="0"/>
               </a:rPr>
-              <a:t>Max 30% exposure per sector.</a:t>
-            </a:r>
-            <a:endParaRPr lang="de-DE" sz="1800" kern="100" dirty="0">
-              <a:effectLst/>
-              <a:latin typeface="Aptos" panose="020B0004020202020204" pitchFamily="34" charset="0"/>
-              <a:ea typeface="Aptos" panose="020B0004020202020204" pitchFamily="34" charset="0"/>
-              <a:cs typeface="Times New Roman" panose="02020603050405020304" pitchFamily="18" charset="0"/>
-            </a:endParaRPr>
-          </a:p>
-          <a:p>
-            <a:pPr>
-              <a:lnSpc>
-                <a:spcPct val="115000"/>
-              </a:lnSpc>
-              <a:spcAft>
-                <a:spcPts val="800"/>
-              </a:spcAft>
-            </a:pPr>
-            <a:endParaRPr lang="fr-FR" sz="1800" kern="100" dirty="0">
-              <a:effectLst/>
-              <a:latin typeface="Aptos" panose="020B0004020202020204" pitchFamily="34" charset="0"/>
-              <a:ea typeface="Aptos" panose="020B0004020202020204" pitchFamily="34" charset="0"/>
-              <a:cs typeface="Times New Roman" panose="02020603050405020304" pitchFamily="18" charset="0"/>
-            </a:endParaRPr>
-          </a:p>
-          <a:p>
-            <a:pPr marL="285750" indent="-285750">
-              <a:buFont typeface="Arial" panose="020B0604020202020204" pitchFamily="34" charset="0"/>
-              <a:buChar char="•"/>
-            </a:pPr>
-            <a:r>
-              <a:rPr lang="en-US" sz="1800" dirty="0">
-                <a:effectLst/>
+              <a:t>Risks</a:t>
+            </a:r>
+            <a:r>
+              <a:rPr lang="de-DE" sz="2800" b="1" dirty="0">
                 <a:latin typeface="Aptos" panose="020B0004020202020204" pitchFamily="34" charset="0"/>
-                <a:ea typeface="Aptos" panose="020B0004020202020204" pitchFamily="34" charset="0"/>
-                <a:cs typeface="Times New Roman" panose="02020603050405020304" pitchFamily="18" charset="0"/>
               </a:rPr>
-              <a:t>Track: max drawdown, Sharpe ratio, beta vs S&amp;P 500</a:t>
-            </a:r>
-          </a:p>
-          <a:p>
-            <a:pPr marL="285750" indent="-285750">
-              <a:buFont typeface="Arial" panose="020B0604020202020204" pitchFamily="34" charset="0"/>
-              <a:buChar char="•"/>
-            </a:pPr>
-            <a:endParaRPr lang="en-US" dirty="0">
-              <a:latin typeface="Aptos" panose="020B0004020202020204" pitchFamily="34" charset="0"/>
-              <a:ea typeface="Aptos" panose="020B0004020202020204" pitchFamily="34" charset="0"/>
-              <a:cs typeface="Times New Roman" panose="02020603050405020304" pitchFamily="18" charset="0"/>
-            </a:endParaRPr>
-          </a:p>
-          <a:p>
-            <a:endParaRPr lang="en-US" sz="1800" dirty="0">
-              <a:effectLst/>
-              <a:latin typeface="Aptos" panose="020B0004020202020204" pitchFamily="34" charset="0"/>
-              <a:ea typeface="Aptos" panose="020B0004020202020204" pitchFamily="34" charset="0"/>
-              <a:cs typeface="Times New Roman" panose="02020603050405020304" pitchFamily="18" charset="0"/>
-            </a:endParaRPr>
-          </a:p>
-          <a:p>
-            <a:endParaRPr lang="fr-FR" dirty="0"/>
+              <a:t>:</a:t>
+            </a:r>
           </a:p>
         </p:txBody>
       </p:sp>
       <p:sp>
         <p:nvSpPr>
-          <p:cNvPr id="3" name="TextBox 2">
+          <p:cNvPr id="2" name="TextBox 1">
             <a:extLst>
               <a:ext uri="{FF2B5EF4-FFF2-40B4-BE49-F238E27FC236}">
-                <a16:creationId xmlns:a16="http://schemas.microsoft.com/office/drawing/2014/main" id="{95A265E5-2326-7FB4-FD5E-479745A7781C}"/>
+                <a16:creationId xmlns:a16="http://schemas.microsoft.com/office/drawing/2014/main" id="{71C19A3E-7532-7CC2-C911-AE6E8C55826D}"/>
               </a:ext>
             </a:extLst>
           </p:cNvPr>
@@ -13603,8 +14580,8 @@
         </p:nvSpPr>
         <p:spPr>
           <a:xfrm>
-            <a:off x="4950759" y="500230"/>
-            <a:ext cx="2366682" cy="369332"/>
+            <a:off x="1113824" y="2338840"/>
+            <a:ext cx="7214617" cy="2605393"/>
           </a:xfrm>
           <a:prstGeom prst="rect">
             <a:avLst/>
@@ -13617,22 +14594,163 @@
           </a:bodyPr>
           <a:lstStyle/>
           <a:p>
-            <a:r>
-              <a:rPr lang="de-DE" b="1" dirty="0">
+            <a:pPr marL="342900" lvl="0" indent="-342900">
+              <a:lnSpc>
+                <a:spcPct val="115000"/>
+              </a:lnSpc>
+              <a:spcAft>
+                <a:spcPts val="800"/>
+              </a:spcAft>
+              <a:buSzPts val="1000"/>
+              <a:buFont typeface="Arial" panose="020B0604020202020204" pitchFamily="34" charset="0"/>
+              <a:buChar char="•"/>
+              <a:tabLst>
+                <a:tab pos="457200" algn="l"/>
+              </a:tabLst>
+            </a:pPr>
+            <a:r>
+              <a:rPr lang="en-US" sz="2400" b="1" kern="100" dirty="0">
+                <a:effectLst/>
                 <a:latin typeface="Aptos" panose="020B0004020202020204" pitchFamily="34" charset="0"/>
+                <a:ea typeface="Aptos" panose="020B0004020202020204" pitchFamily="34" charset="0"/>
+                <a:cs typeface="Times New Roman" panose="02020603050405020304" pitchFamily="18" charset="0"/>
               </a:rPr>
-              <a:t>RISK MANAGEMENT</a:t>
-            </a:r>
-            <a:endParaRPr lang="fr-FR" b="1" dirty="0">
-              <a:latin typeface="Aptos" panose="020B0004020202020204" pitchFamily="34" charset="0"/>
-            </a:endParaRPr>
+              <a:t>Momentum Crashes</a:t>
+            </a:r>
+            <a:endParaRPr lang="fr-FR" dirty="0"/>
+          </a:p>
+          <a:p>
+            <a:pPr marL="342900" lvl="0" indent="-342900">
+              <a:lnSpc>
+                <a:spcPct val="115000"/>
+              </a:lnSpc>
+              <a:spcAft>
+                <a:spcPts val="800"/>
+              </a:spcAft>
+              <a:buSzPts val="1000"/>
+              <a:buFont typeface="Arial" panose="020B0604020202020204" pitchFamily="34" charset="0"/>
+              <a:buChar char="•"/>
+              <a:tabLst>
+                <a:tab pos="457200" algn="l"/>
+              </a:tabLst>
+            </a:pPr>
+            <a:r>
+              <a:rPr lang="fr-FR" sz="2400" b="1" kern="100" dirty="0" err="1">
+                <a:effectLst/>
+                <a:latin typeface="Aptos" panose="020B0004020202020204" pitchFamily="34" charset="0"/>
+                <a:ea typeface="Aptos" panose="020B0004020202020204" pitchFamily="34" charset="0"/>
+                <a:cs typeface="Times New Roman" panose="02020603050405020304" pitchFamily="18" charset="0"/>
+              </a:rPr>
+              <a:t>Sudden</a:t>
+            </a:r>
+            <a:r>
+              <a:rPr lang="fr-FR" sz="2400" b="1" kern="100" dirty="0">
+                <a:effectLst/>
+                <a:latin typeface="Aptos" panose="020B0004020202020204" pitchFamily="34" charset="0"/>
+                <a:ea typeface="Aptos" panose="020B0004020202020204" pitchFamily="34" charset="0"/>
+                <a:cs typeface="Times New Roman" panose="02020603050405020304" pitchFamily="18" charset="0"/>
+              </a:rPr>
+              <a:t> </a:t>
+            </a:r>
+            <a:r>
+              <a:rPr lang="fr-FR" sz="2400" b="1" kern="100" dirty="0" err="1">
+                <a:effectLst/>
+                <a:latin typeface="Aptos" panose="020B0004020202020204" pitchFamily="34" charset="0"/>
+                <a:ea typeface="Aptos" panose="020B0004020202020204" pitchFamily="34" charset="0"/>
+                <a:cs typeface="Times New Roman" panose="02020603050405020304" pitchFamily="18" charset="0"/>
+              </a:rPr>
+              <a:t>Regime</a:t>
+            </a:r>
+            <a:r>
+              <a:rPr lang="fr-FR" sz="2400" b="1" kern="100" dirty="0">
+                <a:effectLst/>
+                <a:latin typeface="Aptos" panose="020B0004020202020204" pitchFamily="34" charset="0"/>
+                <a:ea typeface="Aptos" panose="020B0004020202020204" pitchFamily="34" charset="0"/>
+                <a:cs typeface="Times New Roman" panose="02020603050405020304" pitchFamily="18" charset="0"/>
+              </a:rPr>
+              <a:t> Change</a:t>
+            </a:r>
+          </a:p>
+          <a:p>
+            <a:pPr marL="342900" lvl="0" indent="-342900">
+              <a:lnSpc>
+                <a:spcPct val="115000"/>
+              </a:lnSpc>
+              <a:spcAft>
+                <a:spcPts val="800"/>
+              </a:spcAft>
+              <a:buSzPts val="1000"/>
+              <a:buFont typeface="Arial" panose="020B0604020202020204" pitchFamily="34" charset="0"/>
+              <a:buChar char="•"/>
+              <a:tabLst>
+                <a:tab pos="457200" algn="l"/>
+              </a:tabLst>
+            </a:pPr>
+            <a:r>
+              <a:rPr lang="en-US" sz="2400" b="1" kern="100" dirty="0">
+                <a:effectLst/>
+                <a:latin typeface="Aptos" panose="020B0004020202020204" pitchFamily="34" charset="0"/>
+                <a:ea typeface="Aptos" panose="020B0004020202020204" pitchFamily="34" charset="0"/>
+                <a:cs typeface="Times New Roman" panose="02020603050405020304" pitchFamily="18" charset="0"/>
+              </a:rPr>
+              <a:t>Sector Concentration</a:t>
+            </a:r>
+          </a:p>
+          <a:p>
+            <a:pPr marL="342900" lvl="0" indent="-342900">
+              <a:lnSpc>
+                <a:spcPct val="115000"/>
+              </a:lnSpc>
+              <a:spcAft>
+                <a:spcPts val="800"/>
+              </a:spcAft>
+              <a:buSzPts val="1000"/>
+              <a:buFont typeface="Arial" panose="020B0604020202020204" pitchFamily="34" charset="0"/>
+              <a:buChar char="•"/>
+              <a:tabLst>
+                <a:tab pos="457200" algn="l"/>
+              </a:tabLst>
+            </a:pPr>
+            <a:r>
+              <a:rPr lang="en-US" sz="2400" b="1" kern="100" dirty="0">
+                <a:latin typeface="Aptos" panose="020B0004020202020204" pitchFamily="34" charset="0"/>
+                <a:ea typeface="Aptos" panose="020B0004020202020204" pitchFamily="34" charset="0"/>
+                <a:cs typeface="Times New Roman" panose="02020603050405020304" pitchFamily="18" charset="0"/>
+              </a:rPr>
+              <a:t>Survivorship Bias</a:t>
+            </a:r>
+          </a:p>
+          <a:p>
+            <a:pPr marL="342900" lvl="0" indent="-342900">
+              <a:lnSpc>
+                <a:spcPct val="115000"/>
+              </a:lnSpc>
+              <a:spcAft>
+                <a:spcPts val="800"/>
+              </a:spcAft>
+              <a:buSzPts val="1000"/>
+              <a:buFont typeface="Arial" panose="020B0604020202020204" pitchFamily="34" charset="0"/>
+              <a:buChar char="•"/>
+              <a:tabLst>
+                <a:tab pos="457200" algn="l"/>
+              </a:tabLst>
+            </a:pPr>
+            <a:r>
+              <a:rPr lang="en-US" sz="2400" b="1" kern="100" dirty="0">
+                <a:effectLst/>
+                <a:latin typeface="Aptos" panose="020B0004020202020204" pitchFamily="34" charset="0"/>
+                <a:ea typeface="Aptos" panose="020B0004020202020204" pitchFamily="34" charset="0"/>
+                <a:cs typeface="Times New Roman" panose="02020603050405020304" pitchFamily="18" charset="0"/>
+              </a:rPr>
+              <a:t>Limited Hedging</a:t>
+            </a:r>
           </a:p>
         </p:txBody>
       </p:sp>
     </p:spTree>
     <p:extLst>
       <p:ext uri="{BB962C8B-B14F-4D97-AF65-F5344CB8AC3E}">
-        <p14:creationId xmlns:p14="http://schemas.microsoft.com/office/powerpoint/2010/main" val="1165643818"/>
+        <p14:creationId xmlns:p14="http://schemas.microsoft.com/office/powerpoint/2010/main" val="91877853"/>
       </p:ext>
     </p:extLst>
   </p:cSld>
@@ -13800,7 +14918,7 @@
           <p:cNvPr id="2" name="TextBox 1">
             <a:extLst>
               <a:ext uri="{FF2B5EF4-FFF2-40B4-BE49-F238E27FC236}">
-                <a16:creationId xmlns:a16="http://schemas.microsoft.com/office/drawing/2014/main" id="{264E5984-0385-EB90-C885-D4D4805EF6D3}"/>
+                <a16:creationId xmlns:a16="http://schemas.microsoft.com/office/drawing/2014/main" id="{0C0E56C4-589C-9FE6-2F51-89E75523B498}"/>
               </a:ext>
             </a:extLst>
           </p:cNvPr>
@@ -13809,8 +14927,8 @@
         </p:nvSpPr>
         <p:spPr>
           <a:xfrm>
-            <a:off x="1586385" y="2190929"/>
-            <a:ext cx="4547715" cy="3009542"/>
+            <a:off x="1147481" y="1999681"/>
+            <a:ext cx="6793347" cy="3401957"/>
           </a:xfrm>
           <a:prstGeom prst="rect">
             <a:avLst/>
@@ -13823,157 +14941,80 @@
           </a:bodyPr>
           <a:lstStyle/>
           <a:p>
-            <a:pPr marL="342900" lvl="0" indent="-342900">
+            <a:pPr marL="285750" indent="-285750">
               <a:lnSpc>
                 <a:spcPct val="115000"/>
               </a:lnSpc>
               <a:spcAft>
                 <a:spcPts val="800"/>
               </a:spcAft>
-              <a:buSzPts val="1000"/>
-              <a:buFont typeface="Symbol" panose="05050102010706020507" pitchFamily="18" charset="2"/>
-              <a:buChar char=""/>
-              <a:tabLst>
-                <a:tab pos="457200" algn="l"/>
-              </a:tabLst>
+              <a:buFont typeface="Arial" panose="020B0604020202020204" pitchFamily="34" charset="0"/>
+              <a:buChar char="•"/>
             </a:pPr>
             <a:r>
-              <a:rPr lang="el-GR" sz="1800" b="1" kern="100" dirty="0">
+              <a:rPr lang="en-US" sz="2400" b="1" kern="100" dirty="0">
                 <a:effectLst/>
                 <a:latin typeface="Aptos" panose="020B0004020202020204" pitchFamily="34" charset="0"/>
                 <a:ea typeface="Aptos" panose="020B0004020202020204" pitchFamily="34" charset="0"/>
                 <a:cs typeface="Times New Roman" panose="02020603050405020304" pitchFamily="18" charset="0"/>
               </a:rPr>
-              <a:t>Period:</a:t>
-            </a:r>
-            <a:r>
-              <a:rPr lang="el-GR" sz="1800" kern="100" dirty="0">
+              <a:t>Stop-loss:</a:t>
+            </a:r>
+            <a:r>
+              <a:rPr lang="en-US" sz="2400" kern="100" dirty="0">
                 <a:effectLst/>
                 <a:latin typeface="Aptos" panose="020B0004020202020204" pitchFamily="34" charset="0"/>
                 <a:ea typeface="Aptos" panose="020B0004020202020204" pitchFamily="34" charset="0"/>
                 <a:cs typeface="Times New Roman" panose="02020603050405020304" pitchFamily="18" charset="0"/>
               </a:rPr>
-              <a:t> </a:t>
-            </a:r>
-            <a:r>
-              <a:rPr lang="el-GR" sz="1800" kern="100" dirty="0" err="1">
-                <a:effectLst/>
-                <a:latin typeface="Aptos" panose="020B0004020202020204" pitchFamily="34" charset="0"/>
-                <a:ea typeface="Aptos" panose="020B0004020202020204" pitchFamily="34" charset="0"/>
-                <a:cs typeface="Times New Roman" panose="02020603050405020304" pitchFamily="18" charset="0"/>
-              </a:rPr>
-              <a:t>Last</a:t>
-            </a:r>
-            <a:r>
-              <a:rPr lang="el-GR" sz="1800" kern="100" dirty="0">
-                <a:effectLst/>
-                <a:latin typeface="Aptos" panose="020B0004020202020204" pitchFamily="34" charset="0"/>
-                <a:ea typeface="Aptos" panose="020B0004020202020204" pitchFamily="34" charset="0"/>
-                <a:cs typeface="Times New Roman" panose="02020603050405020304" pitchFamily="18" charset="0"/>
-              </a:rPr>
-              <a:t> </a:t>
-            </a:r>
-            <a:r>
-              <a:rPr lang="en-US" kern="100" dirty="0">
-                <a:latin typeface="Aptos" panose="020B0004020202020204" pitchFamily="34" charset="0"/>
-                <a:ea typeface="Aptos" panose="020B0004020202020204" pitchFamily="34" charset="0"/>
-                <a:cs typeface="Times New Roman" panose="02020603050405020304" pitchFamily="18" charset="0"/>
-              </a:rPr>
-              <a:t>20</a:t>
-            </a:r>
-            <a:r>
-              <a:rPr lang="el-GR" sz="1800" kern="100" dirty="0">
-                <a:effectLst/>
-                <a:latin typeface="Aptos" panose="020B0004020202020204" pitchFamily="34" charset="0"/>
-                <a:ea typeface="Aptos" panose="020B0004020202020204" pitchFamily="34" charset="0"/>
-                <a:cs typeface="Times New Roman" panose="02020603050405020304" pitchFamily="18" charset="0"/>
-              </a:rPr>
-              <a:t> </a:t>
-            </a:r>
-            <a:r>
-              <a:rPr lang="el-GR" sz="1800" kern="100" dirty="0" err="1">
-                <a:effectLst/>
-                <a:latin typeface="Aptos" panose="020B0004020202020204" pitchFamily="34" charset="0"/>
-                <a:ea typeface="Aptos" panose="020B0004020202020204" pitchFamily="34" charset="0"/>
-                <a:cs typeface="Times New Roman" panose="02020603050405020304" pitchFamily="18" charset="0"/>
-              </a:rPr>
-              <a:t>years</a:t>
-            </a:r>
-            <a:endParaRPr lang="fr-FR" sz="1800" kern="100" dirty="0">
-              <a:effectLst/>
-              <a:latin typeface="Aptos" panose="020B0004020202020204" pitchFamily="34" charset="0"/>
-              <a:ea typeface="Aptos" panose="020B0004020202020204" pitchFamily="34" charset="0"/>
-              <a:cs typeface="Times New Roman" panose="02020603050405020304" pitchFamily="18" charset="0"/>
-            </a:endParaRPr>
-          </a:p>
-          <a:p>
-            <a:pPr marL="342900" lvl="0" indent="-342900">
+              <a:t> deterioration in fundamentals.</a:t>
+            </a:r>
+          </a:p>
+          <a:p>
+            <a:pPr>
               <a:lnSpc>
                 <a:spcPct val="115000"/>
               </a:lnSpc>
               <a:spcAft>
                 <a:spcPts val="800"/>
               </a:spcAft>
-              <a:buSzPts val="1000"/>
-              <a:buFont typeface="Symbol" panose="05050102010706020507" pitchFamily="18" charset="2"/>
-              <a:buChar char=""/>
-              <a:tabLst>
-                <a:tab pos="457200" algn="l"/>
-              </a:tabLst>
             </a:pPr>
-            <a:r>
-              <a:rPr lang="en-US" sz="1800" b="1" kern="100" dirty="0">
-                <a:effectLst/>
-                <a:latin typeface="Aptos" panose="020B0004020202020204" pitchFamily="34" charset="0"/>
-                <a:ea typeface="Aptos" panose="020B0004020202020204" pitchFamily="34" charset="0"/>
-                <a:cs typeface="Times New Roman" panose="02020603050405020304" pitchFamily="18" charset="0"/>
-              </a:rPr>
-              <a:t>Benchmark:</a:t>
-            </a:r>
-            <a:r>
-              <a:rPr lang="en-US" sz="1800" kern="100" dirty="0">
-                <a:effectLst/>
-                <a:latin typeface="Aptos" panose="020B0004020202020204" pitchFamily="34" charset="0"/>
-                <a:ea typeface="Aptos" panose="020B0004020202020204" pitchFamily="34" charset="0"/>
-                <a:cs typeface="Times New Roman" panose="02020603050405020304" pitchFamily="18" charset="0"/>
-              </a:rPr>
-              <a:t> S&amp;P 500</a:t>
-            </a:r>
-          </a:p>
-          <a:p>
-            <a:pPr marL="342900" lvl="0" indent="-342900">
+            <a:endParaRPr lang="fr-FR" sz="2400" kern="100" dirty="0">
+              <a:latin typeface="Aptos" panose="020B0004020202020204" pitchFamily="34" charset="0"/>
+              <a:ea typeface="Aptos" panose="020B0004020202020204" pitchFamily="34" charset="0"/>
+              <a:cs typeface="Times New Roman" panose="02020603050405020304" pitchFamily="18" charset="0"/>
+            </a:endParaRPr>
+          </a:p>
+          <a:p>
+            <a:pPr marL="285750" indent="-285750">
               <a:lnSpc>
                 <a:spcPct val="115000"/>
               </a:lnSpc>
               <a:spcAft>
                 <a:spcPts val="800"/>
               </a:spcAft>
-              <a:buSzPts val="1000"/>
-              <a:buFont typeface="Symbol" panose="05050102010706020507" pitchFamily="18" charset="2"/>
-              <a:buChar char=""/>
-              <a:tabLst>
-                <a:tab pos="457200" algn="l"/>
-              </a:tabLst>
+              <a:buFont typeface="Arial" panose="020B0604020202020204" pitchFamily="34" charset="0"/>
+              <a:buChar char="•"/>
             </a:pPr>
             <a:r>
-              <a:rPr lang="en-US" sz="1800" b="1" kern="100" dirty="0">
+              <a:rPr lang="el-GR" sz="2400" b="1" kern="100" dirty="0">
                 <a:effectLst/>
                 <a:latin typeface="Aptos" panose="020B0004020202020204" pitchFamily="34" charset="0"/>
                 <a:ea typeface="Aptos" panose="020B0004020202020204" pitchFamily="34" charset="0"/>
                 <a:cs typeface="Times New Roman" panose="02020603050405020304" pitchFamily="18" charset="0"/>
               </a:rPr>
-              <a:t>Metrics:</a:t>
-            </a:r>
-            <a:r>
-              <a:rPr lang="en-US" sz="1800" kern="100" dirty="0">
+              <a:t>Max 30% </a:t>
+            </a:r>
+            <a:r>
+              <a:rPr lang="el-GR" sz="2400" kern="100" dirty="0">
                 <a:effectLst/>
                 <a:latin typeface="Aptos" panose="020B0004020202020204" pitchFamily="34" charset="0"/>
                 <a:ea typeface="Aptos" panose="020B0004020202020204" pitchFamily="34" charset="0"/>
                 <a:cs typeface="Times New Roman" panose="02020603050405020304" pitchFamily="18" charset="0"/>
               </a:rPr>
-              <a:t> Annualized return, Annualized Volatility, Sharpe ratio, Max Drawdown, Var, CVar </a:t>
-            </a:r>
-            <a:endParaRPr lang="fr-FR" sz="1800" kern="100" dirty="0">
+              <a:t>exposure per sector.</a:t>
+            </a:r>
+            <a:endParaRPr lang="de-DE" sz="2400" kern="100" dirty="0">
               <a:effectLst/>
               <a:latin typeface="Aptos" panose="020B0004020202020204" pitchFamily="34" charset="0"/>
               <a:ea typeface="Aptos" panose="020B0004020202020204" pitchFamily="34" charset="0"/>
@@ -13981,30 +15022,72 @@
             </a:endParaRPr>
           </a:p>
           <a:p>
-            <a:pPr marL="342900" lvl="0" indent="-342900">
+            <a:pPr>
               <a:lnSpc>
                 <a:spcPct val="115000"/>
               </a:lnSpc>
               <a:spcAft>
                 <a:spcPts val="800"/>
               </a:spcAft>
-              <a:buSzPts val="1000"/>
-              <a:buFont typeface="Symbol" panose="05050102010706020507" pitchFamily="18" charset="2"/>
-              <a:buChar char=""/>
-              <a:tabLst>
-                <a:tab pos="457200" algn="l"/>
-              </a:tabLst>
             </a:pPr>
-            <a:r>
-              <a:rPr lang="en-US" sz="1800" kern="100" dirty="0">
+            <a:endParaRPr lang="fr-FR" sz="2400" kern="100" dirty="0">
+              <a:effectLst/>
+              <a:latin typeface="Aptos" panose="020B0004020202020204" pitchFamily="34" charset="0"/>
+              <a:ea typeface="Aptos" panose="020B0004020202020204" pitchFamily="34" charset="0"/>
+              <a:cs typeface="Times New Roman" panose="02020603050405020304" pitchFamily="18" charset="0"/>
+            </a:endParaRPr>
+          </a:p>
+          <a:p>
+            <a:pPr marL="285750" indent="-285750">
+              <a:buFont typeface="Arial" panose="020B0604020202020204" pitchFamily="34" charset="0"/>
+              <a:buChar char="•"/>
+            </a:pPr>
+            <a:r>
+              <a:rPr lang="en-US" sz="2400" b="1" dirty="0">
                 <a:effectLst/>
                 <a:latin typeface="Aptos" panose="020B0004020202020204" pitchFamily="34" charset="0"/>
                 <a:ea typeface="Aptos" panose="020B0004020202020204" pitchFamily="34" charset="0"/>
                 <a:cs typeface="Times New Roman" panose="02020603050405020304" pitchFamily="18" charset="0"/>
               </a:rPr>
-              <a:t>Stress test during market crises (2008, 2020).</a:t>
-            </a:r>
-            <a:endParaRPr lang="fr-FR" sz="1800" kern="100" dirty="0">
+              <a:t>Track: </a:t>
+            </a:r>
+            <a:r>
+              <a:rPr lang="en-US" sz="2400" dirty="0">
+                <a:effectLst/>
+                <a:latin typeface="Aptos" panose="020B0004020202020204" pitchFamily="34" charset="0"/>
+                <a:ea typeface="Aptos" panose="020B0004020202020204" pitchFamily="34" charset="0"/>
+                <a:cs typeface="Times New Roman" panose="02020603050405020304" pitchFamily="18" charset="0"/>
+              </a:rPr>
+              <a:t>max drawdown, Sharpe ratio</a:t>
+            </a:r>
+            <a:r>
+              <a:rPr lang="en-US" sz="2400" dirty="0">
+                <a:latin typeface="Aptos" panose="020B0004020202020204" pitchFamily="34" charset="0"/>
+                <a:ea typeface="Aptos" panose="020B0004020202020204" pitchFamily="34" charset="0"/>
+                <a:cs typeface="Times New Roman" panose="02020603050405020304" pitchFamily="18" charset="0"/>
+              </a:rPr>
+              <a:t>, Var, CVar</a:t>
+            </a:r>
+            <a:endParaRPr lang="en-US" sz="2400" dirty="0">
+              <a:effectLst/>
+              <a:latin typeface="Aptos" panose="020B0004020202020204" pitchFamily="34" charset="0"/>
+              <a:ea typeface="Aptos" panose="020B0004020202020204" pitchFamily="34" charset="0"/>
+              <a:cs typeface="Times New Roman" panose="02020603050405020304" pitchFamily="18" charset="0"/>
+            </a:endParaRPr>
+          </a:p>
+          <a:p>
+            <a:pPr marL="285750" indent="-285750">
+              <a:buFont typeface="Arial" panose="020B0604020202020204" pitchFamily="34" charset="0"/>
+              <a:buChar char="•"/>
+            </a:pPr>
+            <a:endParaRPr lang="en-US" dirty="0">
+              <a:latin typeface="Aptos" panose="020B0004020202020204" pitchFamily="34" charset="0"/>
+              <a:ea typeface="Aptos" panose="020B0004020202020204" pitchFamily="34" charset="0"/>
+              <a:cs typeface="Times New Roman" panose="02020603050405020304" pitchFamily="18" charset="0"/>
+            </a:endParaRPr>
+          </a:p>
+          <a:p>
+            <a:endParaRPr lang="en-US" sz="1800" dirty="0">
               <a:effectLst/>
               <a:latin typeface="Aptos" panose="020B0004020202020204" pitchFamily="34" charset="0"/>
               <a:ea typeface="Aptos" panose="020B0004020202020204" pitchFamily="34" charset="0"/>
@@ -14021,7 +15104,7 @@
           <p:cNvPr id="3" name="TextBox 2">
             <a:extLst>
               <a:ext uri="{FF2B5EF4-FFF2-40B4-BE49-F238E27FC236}">
-                <a16:creationId xmlns:a16="http://schemas.microsoft.com/office/drawing/2014/main" id="{290B7651-B80D-F291-4A1D-1DD563DE679D}"/>
+                <a16:creationId xmlns:a16="http://schemas.microsoft.com/office/drawing/2014/main" id="{95A265E5-2326-7FB4-FD5E-479745A7781C}"/>
               </a:ext>
             </a:extLst>
           </p:cNvPr>
@@ -14030,8 +15113,8 @@
         </p:nvSpPr>
         <p:spPr>
           <a:xfrm>
-            <a:off x="4364467" y="537882"/>
-            <a:ext cx="3752178" cy="369332"/>
+            <a:off x="4251171" y="460473"/>
+            <a:ext cx="3689658" cy="523220"/>
           </a:xfrm>
           <a:prstGeom prst="rect">
             <a:avLst/>
@@ -14045,12 +15128,12 @@
           <a:lstStyle/>
           <a:p>
             <a:r>
-              <a:rPr lang="de-DE" b="1" dirty="0">
+              <a:rPr lang="de-DE" sz="2800" b="1" dirty="0">
                 <a:latin typeface="Aptos" panose="020B0004020202020204" pitchFamily="34" charset="0"/>
               </a:rPr>
-              <a:t>BACKTESTING &amp; PERFORMANCE</a:t>
-            </a:r>
-            <a:endParaRPr lang="fr-FR" b="1" dirty="0">
+              <a:t>RISK MANAGEMENT</a:t>
+            </a:r>
+            <a:endParaRPr lang="fr-FR" sz="2800" b="1" dirty="0">
               <a:latin typeface="Aptos" panose="020B0004020202020204" pitchFamily="34" charset="0"/>
             </a:endParaRPr>
           </a:p>
@@ -14059,7 +15142,7 @@
     </p:spTree>
     <p:extLst>
       <p:ext uri="{BB962C8B-B14F-4D97-AF65-F5344CB8AC3E}">
-        <p14:creationId xmlns:p14="http://schemas.microsoft.com/office/powerpoint/2010/main" val="1986389791"/>
+        <p14:creationId xmlns:p14="http://schemas.microsoft.com/office/powerpoint/2010/main" val="1165643818"/>
       </p:ext>
     </p:extLst>
   </p:cSld>
@@ -14224,10 +15307,10 @@
       </p:grpSpPr>
       <p:sp>
         <p:nvSpPr>
-          <p:cNvPr id="4" name="TextBox 3">
+          <p:cNvPr id="2" name="TextBox 1">
             <a:extLst>
               <a:ext uri="{FF2B5EF4-FFF2-40B4-BE49-F238E27FC236}">
-                <a16:creationId xmlns:a16="http://schemas.microsoft.com/office/drawing/2014/main" id="{ECF369F8-A45E-A725-B2B9-BCAFAADCD144}"/>
+                <a16:creationId xmlns:a16="http://schemas.microsoft.com/office/drawing/2014/main" id="{264E5984-0385-EB90-C885-D4D4805EF6D3}"/>
               </a:ext>
             </a:extLst>
           </p:cNvPr>
@@ -14236,8 +15319,8 @@
         </p:nvSpPr>
         <p:spPr>
           <a:xfrm>
-            <a:off x="4219911" y="458369"/>
-            <a:ext cx="3752178" cy="523220"/>
+            <a:off x="1438360" y="1977320"/>
+            <a:ext cx="7570867" cy="2903359"/>
           </a:xfrm>
           <a:prstGeom prst="rect">
             <a:avLst/>
@@ -14250,18 +15333,232 @@
           </a:bodyPr>
           <a:lstStyle/>
           <a:p>
-            <a:pPr algn="ctr"/>
+            <a:pPr marL="342900" lvl="0" indent="-342900">
+              <a:lnSpc>
+                <a:spcPct val="115000"/>
+              </a:lnSpc>
+              <a:spcAft>
+                <a:spcPts val="800"/>
+              </a:spcAft>
+              <a:buSzPts val="1000"/>
+              <a:buFont typeface="Symbol" panose="05050102010706020507" pitchFamily="18" charset="2"/>
+              <a:buChar char=""/>
+              <a:tabLst>
+                <a:tab pos="457200" algn="l"/>
+              </a:tabLst>
+            </a:pPr>
+            <a:r>
+              <a:rPr lang="el-GR" sz="2400" b="1" kern="100" dirty="0">
+                <a:effectLst/>
+                <a:latin typeface="Aptos" panose="020B0004020202020204" pitchFamily="34" charset="0"/>
+                <a:ea typeface="Aptos" panose="020B0004020202020204" pitchFamily="34" charset="0"/>
+                <a:cs typeface="Times New Roman" panose="02020603050405020304" pitchFamily="18" charset="0"/>
+              </a:rPr>
+              <a:t>Period:</a:t>
+            </a:r>
+            <a:r>
+              <a:rPr lang="el-GR" sz="2400" kern="100" dirty="0">
+                <a:effectLst/>
+                <a:latin typeface="Aptos" panose="020B0004020202020204" pitchFamily="34" charset="0"/>
+                <a:ea typeface="Aptos" panose="020B0004020202020204" pitchFamily="34" charset="0"/>
+                <a:cs typeface="Times New Roman" panose="02020603050405020304" pitchFamily="18" charset="0"/>
+              </a:rPr>
+              <a:t> </a:t>
+            </a:r>
+            <a:r>
+              <a:rPr lang="el-GR" sz="2400" kern="100" dirty="0" err="1">
+                <a:effectLst/>
+                <a:latin typeface="Aptos" panose="020B0004020202020204" pitchFamily="34" charset="0"/>
+                <a:ea typeface="Aptos" panose="020B0004020202020204" pitchFamily="34" charset="0"/>
+                <a:cs typeface="Times New Roman" panose="02020603050405020304" pitchFamily="18" charset="0"/>
+              </a:rPr>
+              <a:t>Last</a:t>
+            </a:r>
+            <a:r>
+              <a:rPr lang="el-GR" sz="2400" kern="100" dirty="0">
+                <a:effectLst/>
+                <a:latin typeface="Aptos" panose="020B0004020202020204" pitchFamily="34" charset="0"/>
+                <a:ea typeface="Aptos" panose="020B0004020202020204" pitchFamily="34" charset="0"/>
+                <a:cs typeface="Times New Roman" panose="02020603050405020304" pitchFamily="18" charset="0"/>
+              </a:rPr>
+              <a:t> </a:t>
+            </a:r>
+            <a:r>
+              <a:rPr lang="en-US" sz="2400" kern="100" dirty="0">
+                <a:latin typeface="Aptos" panose="020B0004020202020204" pitchFamily="34" charset="0"/>
+                <a:ea typeface="Aptos" panose="020B0004020202020204" pitchFamily="34" charset="0"/>
+                <a:cs typeface="Times New Roman" panose="02020603050405020304" pitchFamily="18" charset="0"/>
+              </a:rPr>
+              <a:t>20</a:t>
+            </a:r>
+            <a:r>
+              <a:rPr lang="el-GR" sz="2400" kern="100" dirty="0">
+                <a:effectLst/>
+                <a:latin typeface="Aptos" panose="020B0004020202020204" pitchFamily="34" charset="0"/>
+                <a:ea typeface="Aptos" panose="020B0004020202020204" pitchFamily="34" charset="0"/>
+                <a:cs typeface="Times New Roman" panose="02020603050405020304" pitchFamily="18" charset="0"/>
+              </a:rPr>
+              <a:t> </a:t>
+            </a:r>
+            <a:r>
+              <a:rPr lang="el-GR" sz="2400" kern="100" dirty="0" err="1">
+                <a:effectLst/>
+                <a:latin typeface="Aptos" panose="020B0004020202020204" pitchFamily="34" charset="0"/>
+                <a:ea typeface="Aptos" panose="020B0004020202020204" pitchFamily="34" charset="0"/>
+                <a:cs typeface="Times New Roman" panose="02020603050405020304" pitchFamily="18" charset="0"/>
+              </a:rPr>
+              <a:t>years</a:t>
+            </a:r>
+            <a:endParaRPr lang="fr-FR" sz="2400" kern="100" dirty="0">
+              <a:effectLst/>
+              <a:latin typeface="Aptos" panose="020B0004020202020204" pitchFamily="34" charset="0"/>
+              <a:ea typeface="Aptos" panose="020B0004020202020204" pitchFamily="34" charset="0"/>
+              <a:cs typeface="Times New Roman" panose="02020603050405020304" pitchFamily="18" charset="0"/>
+            </a:endParaRPr>
+          </a:p>
+          <a:p>
+            <a:pPr marL="342900" lvl="0" indent="-342900">
+              <a:lnSpc>
+                <a:spcPct val="115000"/>
+              </a:lnSpc>
+              <a:spcAft>
+                <a:spcPts val="800"/>
+              </a:spcAft>
+              <a:buSzPts val="1000"/>
+              <a:buFont typeface="Symbol" panose="05050102010706020507" pitchFamily="18" charset="2"/>
+              <a:buChar char=""/>
+              <a:tabLst>
+                <a:tab pos="457200" algn="l"/>
+              </a:tabLst>
+            </a:pPr>
+            <a:r>
+              <a:rPr lang="en-US" sz="2400" b="1" kern="100" dirty="0">
+                <a:effectLst/>
+                <a:latin typeface="Aptos" panose="020B0004020202020204" pitchFamily="34" charset="0"/>
+                <a:ea typeface="Aptos" panose="020B0004020202020204" pitchFamily="34" charset="0"/>
+                <a:cs typeface="Times New Roman" panose="02020603050405020304" pitchFamily="18" charset="0"/>
+              </a:rPr>
+              <a:t>Benchmark:</a:t>
+            </a:r>
+            <a:r>
+              <a:rPr lang="en-US" sz="2400" kern="100" dirty="0">
+                <a:effectLst/>
+                <a:latin typeface="Aptos" panose="020B0004020202020204" pitchFamily="34" charset="0"/>
+                <a:ea typeface="Aptos" panose="020B0004020202020204" pitchFamily="34" charset="0"/>
+                <a:cs typeface="Times New Roman" panose="02020603050405020304" pitchFamily="18" charset="0"/>
+              </a:rPr>
+              <a:t> S&amp;P 500</a:t>
+            </a:r>
+          </a:p>
+          <a:p>
+            <a:pPr marL="342900" lvl="0" indent="-342900">
+              <a:lnSpc>
+                <a:spcPct val="115000"/>
+              </a:lnSpc>
+              <a:spcAft>
+                <a:spcPts val="800"/>
+              </a:spcAft>
+              <a:buSzPts val="1000"/>
+              <a:buFont typeface="Symbol" panose="05050102010706020507" pitchFamily="18" charset="2"/>
+              <a:buChar char=""/>
+              <a:tabLst>
+                <a:tab pos="457200" algn="l"/>
+              </a:tabLst>
+            </a:pPr>
+            <a:r>
+              <a:rPr lang="en-US" sz="2400" b="1" kern="100" dirty="0">
+                <a:effectLst/>
+                <a:latin typeface="Aptos" panose="020B0004020202020204" pitchFamily="34" charset="0"/>
+                <a:ea typeface="Aptos" panose="020B0004020202020204" pitchFamily="34" charset="0"/>
+                <a:cs typeface="Times New Roman" panose="02020603050405020304" pitchFamily="18" charset="0"/>
+              </a:rPr>
+              <a:t>Metrics:</a:t>
+            </a:r>
+            <a:r>
+              <a:rPr lang="en-US" sz="2400" kern="100" dirty="0">
+                <a:effectLst/>
+                <a:latin typeface="Aptos" panose="020B0004020202020204" pitchFamily="34" charset="0"/>
+                <a:ea typeface="Aptos" panose="020B0004020202020204" pitchFamily="34" charset="0"/>
+                <a:cs typeface="Times New Roman" panose="02020603050405020304" pitchFamily="18" charset="0"/>
+              </a:rPr>
+              <a:t> Annualized return, Annualized Volatility, Sharpe ratio, Max Drawdown, Var, CVar </a:t>
+            </a:r>
+            <a:endParaRPr lang="fr-FR" sz="2400" kern="100" dirty="0">
+              <a:effectLst/>
+              <a:latin typeface="Aptos" panose="020B0004020202020204" pitchFamily="34" charset="0"/>
+              <a:ea typeface="Aptos" panose="020B0004020202020204" pitchFamily="34" charset="0"/>
+              <a:cs typeface="Times New Roman" panose="02020603050405020304" pitchFamily="18" charset="0"/>
+            </a:endParaRPr>
+          </a:p>
+          <a:p>
+            <a:pPr marL="342900" lvl="0" indent="-342900">
+              <a:lnSpc>
+                <a:spcPct val="115000"/>
+              </a:lnSpc>
+              <a:spcAft>
+                <a:spcPts val="800"/>
+              </a:spcAft>
+              <a:buSzPts val="1000"/>
+              <a:buFont typeface="Symbol" panose="05050102010706020507" pitchFamily="18" charset="2"/>
+              <a:buChar char=""/>
+              <a:tabLst>
+                <a:tab pos="457200" algn="l"/>
+              </a:tabLst>
+            </a:pPr>
+            <a:r>
+              <a:rPr lang="en-US" sz="2400" kern="100" dirty="0">
+                <a:effectLst/>
+                <a:latin typeface="Aptos" panose="020B0004020202020204" pitchFamily="34" charset="0"/>
+                <a:ea typeface="Aptos" panose="020B0004020202020204" pitchFamily="34" charset="0"/>
+                <a:cs typeface="Times New Roman" panose="02020603050405020304" pitchFamily="18" charset="0"/>
+              </a:rPr>
+              <a:t>Stress test during market crises (2008, 2020).</a:t>
+            </a:r>
+            <a:endParaRPr lang="fr-FR" sz="2400" kern="100" dirty="0">
+              <a:effectLst/>
+              <a:latin typeface="Aptos" panose="020B0004020202020204" pitchFamily="34" charset="0"/>
+              <a:ea typeface="Aptos" panose="020B0004020202020204" pitchFamily="34" charset="0"/>
+              <a:cs typeface="Times New Roman" panose="02020603050405020304" pitchFamily="18" charset="0"/>
+            </a:endParaRPr>
+          </a:p>
+          <a:p>
+            <a:endParaRPr lang="fr-FR" dirty="0"/>
+          </a:p>
+        </p:txBody>
+      </p:sp>
+      <p:sp>
+        <p:nvSpPr>
+          <p:cNvPr id="3" name="TextBox 2">
+            <a:extLst>
+              <a:ext uri="{FF2B5EF4-FFF2-40B4-BE49-F238E27FC236}">
+                <a16:creationId xmlns:a16="http://schemas.microsoft.com/office/drawing/2014/main" id="{290B7651-B80D-F291-4A1D-1DD563DE679D}"/>
+              </a:ext>
+            </a:extLst>
+          </p:cNvPr>
+          <p:cNvSpPr txBox="1"/>
+          <p:nvPr/>
+        </p:nvSpPr>
+        <p:spPr>
+          <a:xfrm>
+            <a:off x="3182772" y="365604"/>
+            <a:ext cx="5826455" cy="523220"/>
+          </a:xfrm>
+          <a:prstGeom prst="rect">
+            <a:avLst/>
+          </a:prstGeom>
+          <a:noFill/>
+        </p:spPr>
+        <p:txBody>
+          <a:bodyPr wrap="square" rtlCol="0">
+            <a:spAutoFit/>
+          </a:bodyPr>
+          <a:lstStyle/>
+          <a:p>
             <a:r>
               <a:rPr lang="de-DE" sz="2800" b="1" dirty="0">
                 <a:latin typeface="Aptos" panose="020B0004020202020204" pitchFamily="34" charset="0"/>
               </a:rPr>
-              <a:t>Potential </a:t>
-            </a:r>
-            <a:r>
-              <a:rPr lang="de-DE" sz="2800" b="1" dirty="0" err="1">
-                <a:latin typeface="Aptos" panose="020B0004020202020204" pitchFamily="34" charset="0"/>
-              </a:rPr>
-              <a:t>Risks</a:t>
+              <a:t>BACKTESTING &amp; PERFORMANCE</a:t>
             </a:r>
             <a:endParaRPr lang="fr-FR" sz="2800" b="1" dirty="0">
               <a:latin typeface="Aptos" panose="020B0004020202020204" pitchFamily="34" charset="0"/>
@@ -14272,7 +15569,7 @@
     </p:spTree>
     <p:extLst>
       <p:ext uri="{BB962C8B-B14F-4D97-AF65-F5344CB8AC3E}">
-        <p14:creationId xmlns:p14="http://schemas.microsoft.com/office/powerpoint/2010/main" val="91877853"/>
+        <p14:creationId xmlns:p14="http://schemas.microsoft.com/office/powerpoint/2010/main" val="1986389791"/>
       </p:ext>
     </p:extLst>
   </p:cSld>
@@ -14291,6 +15588,130 @@
       </p:transition>
     </mc:Fallback>
   </mc:AlternateContent>
+  <p:timing>
+    <p:tnLst>
+      <p:par>
+        <p:cTn id="1" dur="indefinite" restart="never" nodeType="tmRoot">
+          <p:childTnLst>
+            <p:seq concurrent="1" nextAc="seek">
+              <p:cTn id="2" dur="indefinite" nodeType="mainSeq">
+                <p:childTnLst>
+                  <p:par>
+                    <p:cTn id="3" fill="hold">
+                      <p:stCondLst>
+                        <p:cond delay="indefinite"/>
+                      </p:stCondLst>
+                      <p:childTnLst>
+                        <p:par>
+                          <p:cTn id="4" fill="hold">
+                            <p:stCondLst>
+                              <p:cond delay="0"/>
+                            </p:stCondLst>
+                            <p:childTnLst>
+                              <p:par>
+                                <p:cTn id="5" presetID="2" presetClass="entr" presetSubtype="8" fill="hold" grpId="0" nodeType="clickEffect">
+                                  <p:stCondLst>
+                                    <p:cond delay="0"/>
+                                  </p:stCondLst>
+                                  <p:childTnLst>
+                                    <p:set>
+                                      <p:cBhvr>
+                                        <p:cTn id="6" dur="1" fill="hold">
+                                          <p:stCondLst>
+                                            <p:cond delay="0"/>
+                                          </p:stCondLst>
+                                        </p:cTn>
+                                        <p:tgtEl>
+                                          <p:spTgt spid="2"/>
+                                        </p:tgtEl>
+                                        <p:attrNameLst>
+                                          <p:attrName>style.visibility</p:attrName>
+                                        </p:attrNameLst>
+                                      </p:cBhvr>
+                                      <p:to>
+                                        <p:strVal val="visible"/>
+                                      </p:to>
+                                    </p:set>
+                                    <p:anim calcmode="lin" valueType="num">
+                                      <p:cBhvr additive="base">
+                                        <p:cTn id="7" dur="1000" fill="hold"/>
+                                        <p:tgtEl>
+                                          <p:spTgt spid="2"/>
+                                        </p:tgtEl>
+                                        <p:attrNameLst>
+                                          <p:attrName>ppt_x</p:attrName>
+                                        </p:attrNameLst>
+                                      </p:cBhvr>
+                                      <p:tavLst>
+                                        <p:tav tm="0">
+                                          <p:val>
+                                            <p:strVal val="0-#ppt_w/2"/>
+                                          </p:val>
+                                        </p:tav>
+                                        <p:tav tm="100000">
+                                          <p:val>
+                                            <p:strVal val="#ppt_x"/>
+                                          </p:val>
+                                        </p:tav>
+                                      </p:tavLst>
+                                    </p:anim>
+                                    <p:anim calcmode="lin" valueType="num">
+                                      <p:cBhvr additive="base">
+                                        <p:cTn id="8" dur="1000" fill="hold"/>
+                                        <p:tgtEl>
+                                          <p:spTgt spid="2"/>
+                                        </p:tgtEl>
+                                        <p:attrNameLst>
+                                          <p:attrName>ppt_y</p:attrName>
+                                        </p:attrNameLst>
+                                      </p:cBhvr>
+                                      <p:tavLst>
+                                        <p:tav tm="0">
+                                          <p:val>
+                                            <p:strVal val="#ppt_y"/>
+                                          </p:val>
+                                        </p:tav>
+                                        <p:tav tm="100000">
+                                          <p:val>
+                                            <p:strVal val="#ppt_y"/>
+                                          </p:val>
+                                        </p:tav>
+                                      </p:tavLst>
+                                    </p:anim>
+                                  </p:childTnLst>
+                                </p:cTn>
+                              </p:par>
+                            </p:childTnLst>
+                          </p:cTn>
+                        </p:par>
+                      </p:childTnLst>
+                    </p:cTn>
+                  </p:par>
+                </p:childTnLst>
+              </p:cTn>
+              <p:prevCondLst>
+                <p:cond evt="onPrev" delay="0">
+                  <p:tgtEl>
+                    <p:sldTgt/>
+                  </p:tgtEl>
+                </p:cond>
+              </p:prevCondLst>
+              <p:nextCondLst>
+                <p:cond evt="onNext" delay="0">
+                  <p:tgtEl>
+                    <p:sldTgt/>
+                  </p:tgtEl>
+                </p:cond>
+              </p:nextCondLst>
+            </p:seq>
+          </p:childTnLst>
+        </p:cTn>
+      </p:par>
+    </p:tnLst>
+    <p:bldLst>
+      <p:bldP spid="2" grpId="0"/>
+    </p:bldLst>
+  </p:timing>
 </p:sld>
 </file>
 

</xml_diff>